<commit_message>
Update UI class diagram
</commit_message>
<xml_diff>
--- a/docs/diagrams/UiComponentClassDiagram.pptx
+++ b/docs/diagrams/UiComponentClassDiagram.pptx
@@ -208,7 +208,7 @@
           <a:p>
             <a:fld id="{F5CC4B3F-88C1-4FFA-B1B6-F41C21DC6924}" type="datetimeFigureOut">
               <a:rPr lang="en-US" smtClean="0"/>
-              <a:t>10/25/18</a:t>
+              <a:t>10/30/2018</a:t>
             </a:fld>
             <a:endParaRPr lang="en-US"/>
           </a:p>
@@ -654,7 +654,7 @@
           <a:p>
             <a:fld id="{78C97017-6FC3-485B-9764-EAC9E56C1D49}" type="datetimeFigureOut">
               <a:rPr lang="en-US" smtClean="0"/>
-              <a:t>10/25/18</a:t>
+              <a:t>10/30/2018</a:t>
             </a:fld>
             <a:endParaRPr lang="en-US"/>
           </a:p>
@@ -822,7 +822,7 @@
           <a:p>
             <a:fld id="{78C97017-6FC3-485B-9764-EAC9E56C1D49}" type="datetimeFigureOut">
               <a:rPr lang="en-US" smtClean="0"/>
-              <a:t>10/25/18</a:t>
+              <a:t>10/30/2018</a:t>
             </a:fld>
             <a:endParaRPr lang="en-US"/>
           </a:p>
@@ -1000,7 +1000,7 @@
           <a:p>
             <a:fld id="{78C97017-6FC3-485B-9764-EAC9E56C1D49}" type="datetimeFigureOut">
               <a:rPr lang="en-US" smtClean="0"/>
-              <a:t>10/25/18</a:t>
+              <a:t>10/30/2018</a:t>
             </a:fld>
             <a:endParaRPr lang="en-US"/>
           </a:p>
@@ -1168,7 +1168,7 @@
           <a:p>
             <a:fld id="{78C97017-6FC3-485B-9764-EAC9E56C1D49}" type="datetimeFigureOut">
               <a:rPr lang="en-US" smtClean="0"/>
-              <a:t>10/25/18</a:t>
+              <a:t>10/30/2018</a:t>
             </a:fld>
             <a:endParaRPr lang="en-US"/>
           </a:p>
@@ -1413,7 +1413,7 @@
           <a:p>
             <a:fld id="{78C97017-6FC3-485B-9764-EAC9E56C1D49}" type="datetimeFigureOut">
               <a:rPr lang="en-US" smtClean="0"/>
-              <a:t>10/25/18</a:t>
+              <a:t>10/30/2018</a:t>
             </a:fld>
             <a:endParaRPr lang="en-US"/>
           </a:p>
@@ -1698,7 +1698,7 @@
           <a:p>
             <a:fld id="{78C97017-6FC3-485B-9764-EAC9E56C1D49}" type="datetimeFigureOut">
               <a:rPr lang="en-US" smtClean="0"/>
-              <a:t>10/25/18</a:t>
+              <a:t>10/30/2018</a:t>
             </a:fld>
             <a:endParaRPr lang="en-US"/>
           </a:p>
@@ -2117,7 +2117,7 @@
           <a:p>
             <a:fld id="{78C97017-6FC3-485B-9764-EAC9E56C1D49}" type="datetimeFigureOut">
               <a:rPr lang="en-US" smtClean="0"/>
-              <a:t>10/25/18</a:t>
+              <a:t>10/30/2018</a:t>
             </a:fld>
             <a:endParaRPr lang="en-US"/>
           </a:p>
@@ -2234,7 +2234,7 @@
           <a:p>
             <a:fld id="{78C97017-6FC3-485B-9764-EAC9E56C1D49}" type="datetimeFigureOut">
               <a:rPr lang="en-US" smtClean="0"/>
-              <a:t>10/25/18</a:t>
+              <a:t>10/30/2018</a:t>
             </a:fld>
             <a:endParaRPr lang="en-US"/>
           </a:p>
@@ -2329,7 +2329,7 @@
           <a:p>
             <a:fld id="{78C97017-6FC3-485B-9764-EAC9E56C1D49}" type="datetimeFigureOut">
               <a:rPr lang="en-US" smtClean="0"/>
-              <a:t>10/25/18</a:t>
+              <a:t>10/30/2018</a:t>
             </a:fld>
             <a:endParaRPr lang="en-US"/>
           </a:p>
@@ -2604,7 +2604,7 @@
           <a:p>
             <a:fld id="{78C97017-6FC3-485B-9764-EAC9E56C1D49}" type="datetimeFigureOut">
               <a:rPr lang="en-US" smtClean="0"/>
-              <a:t>10/25/18</a:t>
+              <a:t>10/30/2018</a:t>
             </a:fld>
             <a:endParaRPr lang="en-US"/>
           </a:p>
@@ -2856,7 +2856,7 @@
           <a:p>
             <a:fld id="{78C97017-6FC3-485B-9764-EAC9E56C1D49}" type="datetimeFigureOut">
               <a:rPr lang="en-US" smtClean="0"/>
-              <a:t>10/25/18</a:t>
+              <a:t>10/30/2018</a:t>
             </a:fld>
             <a:endParaRPr lang="en-US"/>
           </a:p>
@@ -3067,7 +3067,7 @@
           <a:p>
             <a:fld id="{78C97017-6FC3-485B-9764-EAC9E56C1D49}" type="datetimeFigureOut">
               <a:rPr lang="en-US" smtClean="0"/>
-              <a:t>10/25/18</a:t>
+              <a:t>10/30/2018</a:t>
             </a:fld>
             <a:endParaRPr lang="en-US"/>
           </a:p>
@@ -3450,8 +3450,8 @@
         </p:nvSpPr>
         <p:spPr>
           <a:xfrm>
-            <a:off x="1217465" y="1447800"/>
-            <a:ext cx="4917083" cy="3962400"/>
+            <a:off x="644734" y="1447799"/>
+            <a:ext cx="5527466" cy="4648201"/>
           </a:xfrm>
           <a:prstGeom prst="roundRect">
             <a:avLst>
@@ -3733,8 +3733,8 @@
           <p:nvPr/>
         </p:nvSpPr>
         <p:spPr>
-          <a:xfrm rot="10800000" flipV="1">
-            <a:off x="5394717" y="2110477"/>
+          <a:xfrm rot="5400000" flipV="1">
+            <a:off x="1612814" y="4370669"/>
             <a:ext cx="270504" cy="175523"/>
           </a:xfrm>
           <a:prstGeom prst="triangle">
@@ -3777,13 +3777,15 @@
       <p:cxnSp>
         <p:nvCxnSpPr>
           <p:cNvPr id="19" name="Elbow Connector 122"/>
-          <p:cNvCxnSpPr/>
+          <p:cNvCxnSpPr>
+            <a:cxnSpLocks/>
+          </p:cNvCxnSpPr>
           <p:nvPr/>
         </p:nvCxnSpPr>
         <p:spPr>
-          <a:xfrm flipV="1">
-            <a:off x="644735" y="2991937"/>
-            <a:ext cx="684904" cy="1"/>
+          <a:xfrm>
+            <a:off x="288861" y="2651688"/>
+            <a:ext cx="563920" cy="1"/>
           </a:xfrm>
           <a:prstGeom prst="bentConnector3">
             <a:avLst>
@@ -3945,7 +3947,7 @@
         </p:nvSpPr>
         <p:spPr>
           <a:xfrm>
-            <a:off x="2592527" y="4563759"/>
+            <a:off x="2604792" y="5266254"/>
             <a:ext cx="1093635" cy="236841"/>
           </a:xfrm>
           <a:prstGeom prst="rect">
@@ -4005,8 +4007,8 @@
         </p:nvSpPr>
         <p:spPr>
           <a:xfrm>
-            <a:off x="2592526" y="3991960"/>
-            <a:ext cx="1093635" cy="236841"/>
+            <a:off x="3278398" y="3967579"/>
+            <a:ext cx="1093635" cy="359339"/>
           </a:xfrm>
           <a:prstGeom prst="rect">
             <a:avLst/>
@@ -4038,6 +4040,19 @@
           <a:p>
             <a:pPr algn="ctr"/>
             <a:r>
+              <a:rPr lang="en-US" sz="1050" b="1" dirty="0">
+                <a:solidFill>
+                  <a:schemeClr val="accent3">
+                    <a:lumMod val="75000"/>
+                  </a:schemeClr>
+                </a:solidFill>
+              </a:rPr>
+              <a:t>{abstract}</a:t>
+            </a:r>
+          </a:p>
+          <a:p>
+            <a:pPr algn="ctr"/>
+            <a:r>
               <a:rPr lang="en-US" sz="1050" b="1" dirty="0" err="1">
                 <a:solidFill>
                   <a:schemeClr val="accent3">
@@ -4045,7 +4060,7 @@
                   </a:schemeClr>
                 </a:solidFill>
               </a:rPr>
-              <a:t>LoanListPanel</a:t>
+              <a:t>ListPanel</a:t>
             </a:r>
             <a:endParaRPr lang="en-SG" sz="1050" b="1" dirty="0">
               <a:solidFill>
@@ -4065,8 +4080,8 @@
         </p:nvSpPr>
         <p:spPr>
           <a:xfrm>
-            <a:off x="3839323" y="4228801"/>
-            <a:ext cx="1040906" cy="236841"/>
+            <a:off x="4876800" y="3954261"/>
+            <a:ext cx="1040906" cy="385524"/>
           </a:xfrm>
           <a:prstGeom prst="rect">
             <a:avLst/>
@@ -4098,14 +4113,27 @@
           <a:p>
             <a:pPr algn="ctr"/>
             <a:r>
-              <a:rPr lang="en-US" sz="1050" b="1">
+              <a:rPr lang="en-US" sz="1050" b="1" dirty="0">
                 <a:solidFill>
                   <a:schemeClr val="accent3">
                     <a:lumMod val="75000"/>
                   </a:schemeClr>
                 </a:solidFill>
               </a:rPr>
-              <a:t>LoanCard</a:t>
+              <a:t>{abstract}</a:t>
+            </a:r>
+          </a:p>
+          <a:p>
+            <a:pPr algn="ctr"/>
+            <a:r>
+              <a:rPr lang="en-US" sz="1050" b="1" dirty="0" err="1">
+                <a:solidFill>
+                  <a:schemeClr val="accent3">
+                    <a:lumMod val="75000"/>
+                  </a:schemeClr>
+                </a:solidFill>
+              </a:rPr>
+              <a:t>ListCard</a:t>
             </a:r>
             <a:endParaRPr lang="en-SG" sz="1050" b="1" dirty="0">
               <a:solidFill>
@@ -4125,7 +4153,7 @@
         </p:nvSpPr>
         <p:spPr>
           <a:xfrm>
-            <a:off x="2592528" y="4966000"/>
+            <a:off x="2604793" y="5668495"/>
             <a:ext cx="1093635" cy="236841"/>
           </a:xfrm>
           <a:prstGeom prst="rect">
@@ -4371,6 +4399,7 @@
         <p:nvCxnSpPr>
           <p:cNvPr id="47" name="Elbow Connector 63"/>
           <p:cNvCxnSpPr>
+            <a:cxnSpLocks/>
             <a:stCxn id="39" idx="2"/>
             <a:endCxn id="36" idx="1"/>
           </p:cNvCxnSpPr>
@@ -4378,8 +4407,8 @@
         </p:nvCxnSpPr>
         <p:spPr>
           <a:xfrm rot="16200000" flipH="1">
-            <a:off x="1883148" y="3401003"/>
-            <a:ext cx="1242356" cy="176400"/>
+            <a:off x="2207650" y="3076501"/>
+            <a:ext cx="1279224" cy="862272"/>
           </a:xfrm>
           <a:prstGeom prst="bentConnector2">
             <a:avLst/>
@@ -4408,87 +4437,6 @@
           </a:fontRef>
         </p:style>
       </p:cxnSp>
-      <p:cxnSp>
-        <p:nvCxnSpPr>
-          <p:cNvPr id="50" name="Elbow Connector 63"/>
-          <p:cNvCxnSpPr>
-            <a:stCxn id="39" idx="2"/>
-            <a:endCxn id="35" idx="1"/>
-          </p:cNvCxnSpPr>
-          <p:nvPr/>
-        </p:nvCxnSpPr>
-        <p:spPr>
-          <a:xfrm rot="16200000" flipH="1">
-            <a:off x="1597249" y="3686901"/>
-            <a:ext cx="1814155" cy="176401"/>
-          </a:xfrm>
-          <a:prstGeom prst="bentConnector2">
-            <a:avLst/>
-          </a:prstGeom>
-          <a:ln w="19050">
-            <a:solidFill>
-              <a:schemeClr val="accent3"/>
-            </a:solidFill>
-            <a:headEnd type="none" w="med" len="med"/>
-            <a:tailEnd type="arrow" w="med" len="med"/>
-          </a:ln>
-          <a:effectLst/>
-        </p:spPr>
-        <p:style>
-          <a:lnRef idx="1">
-            <a:schemeClr val="accent2"/>
-          </a:lnRef>
-          <a:fillRef idx="2">
-            <a:schemeClr val="accent2"/>
-          </a:fillRef>
-          <a:effectRef idx="1">
-            <a:schemeClr val="accent2"/>
-          </a:effectRef>
-          <a:fontRef idx="minor">
-            <a:schemeClr val="dk1"/>
-          </a:fontRef>
-        </p:style>
-      </p:cxnSp>
-      <p:cxnSp>
-        <p:nvCxnSpPr>
-          <p:cNvPr id="53" name="Elbow Connector 63"/>
-          <p:cNvCxnSpPr>
-            <a:endCxn id="38" idx="1"/>
-          </p:cNvCxnSpPr>
-          <p:nvPr/>
-        </p:nvCxnSpPr>
-        <p:spPr>
-          <a:xfrm rot="16200000" flipH="1">
-            <a:off x="1184119" y="3676012"/>
-            <a:ext cx="2396440" cy="420377"/>
-          </a:xfrm>
-          <a:prstGeom prst="bentConnector2">
-            <a:avLst/>
-          </a:prstGeom>
-          <a:ln w="19050">
-            <a:solidFill>
-              <a:schemeClr val="accent3"/>
-            </a:solidFill>
-            <a:headEnd type="none" w="med" len="med"/>
-            <a:tailEnd type="arrow" w="med" len="med"/>
-          </a:ln>
-          <a:effectLst/>
-        </p:spPr>
-        <p:style>
-          <a:lnRef idx="1">
-            <a:schemeClr val="accent2"/>
-          </a:lnRef>
-          <a:fillRef idx="2">
-            <a:schemeClr val="accent2"/>
-          </a:fillRef>
-          <a:effectRef idx="1">
-            <a:schemeClr val="accent2"/>
-          </a:effectRef>
-          <a:fontRef idx="minor">
-            <a:schemeClr val="dk1"/>
-          </a:fontRef>
-        </p:style>
-      </p:cxnSp>
       <p:sp>
         <p:nvSpPr>
           <p:cNvPr id="73" name="Rectangle 62"/>
@@ -4497,7 +4445,7 @@
         </p:nvSpPr>
         <p:spPr>
           <a:xfrm>
-            <a:off x="5143948" y="1770924"/>
+            <a:off x="905476" y="4259943"/>
             <a:ext cx="772043" cy="346760"/>
           </a:xfrm>
           <a:prstGeom prst="rect">
@@ -4572,18 +4520,21 @@
         <p:nvCxnSpPr>
           <p:cNvPr id="74" name="Elbow Connector 63"/>
           <p:cNvCxnSpPr>
-            <a:stCxn id="43" idx="3"/>
+            <a:cxnSpLocks/>
+            <a:stCxn id="104" idx="1"/>
             <a:endCxn id="16" idx="3"/>
           </p:cNvCxnSpPr>
           <p:nvPr/>
         </p:nvCxnSpPr>
         <p:spPr>
-          <a:xfrm flipV="1">
-            <a:off x="3686160" y="2286000"/>
-            <a:ext cx="1843809" cy="1136729"/>
-          </a:xfrm>
-          <a:prstGeom prst="bentConnector2">
-            <a:avLst/>
+          <a:xfrm rot="10800000" flipV="1">
+            <a:off x="1835828" y="3485595"/>
+            <a:ext cx="754968" cy="972836"/>
+          </a:xfrm>
+          <a:prstGeom prst="bentConnector3">
+            <a:avLst>
+              <a:gd name="adj1" fmla="val 82298"/>
+            </a:avLst>
           </a:prstGeom>
           <a:ln w="6350">
             <a:solidFill>
@@ -4613,15 +4564,16 @@
         <p:nvCxnSpPr>
           <p:cNvPr id="77" name="Elbow Connector 63"/>
           <p:cNvCxnSpPr>
+            <a:cxnSpLocks/>
             <a:stCxn id="16" idx="3"/>
-            <a:endCxn id="37" idx="3"/>
+            <a:endCxn id="113" idx="2"/>
           </p:cNvCxnSpPr>
           <p:nvPr/>
         </p:nvCxnSpPr>
         <p:spPr>
-          <a:xfrm rot="5400000">
-            <a:off x="4174488" y="2991741"/>
-            <a:ext cx="2061222" cy="649740"/>
+          <a:xfrm flipV="1">
+            <a:off x="1835828" y="4354489"/>
+            <a:ext cx="3188895" cy="103942"/>
           </a:xfrm>
           <a:prstGeom prst="bentConnector2">
             <a:avLst/>
@@ -4654,18 +4606,21 @@
         <p:nvCxnSpPr>
           <p:cNvPr id="82" name="Elbow Connector 63"/>
           <p:cNvCxnSpPr>
+            <a:cxnSpLocks/>
             <a:stCxn id="16" idx="3"/>
-            <a:endCxn id="34" idx="3"/>
+            <a:endCxn id="105" idx="1"/>
           </p:cNvCxnSpPr>
           <p:nvPr/>
         </p:nvCxnSpPr>
         <p:spPr>
-          <a:xfrm rot="5400000">
-            <a:off x="3867176" y="2104987"/>
-            <a:ext cx="1481780" cy="1843806"/>
-          </a:xfrm>
-          <a:prstGeom prst="bentConnector2">
-            <a:avLst/>
+          <a:xfrm flipV="1">
+            <a:off x="1835828" y="3829536"/>
+            <a:ext cx="758748" cy="628895"/>
+          </a:xfrm>
+          <a:prstGeom prst="bentConnector3">
+            <a:avLst>
+              <a:gd name="adj1" fmla="val 16859"/>
+            </a:avLst>
           </a:prstGeom>
           <a:ln w="6350">
             <a:solidFill>
@@ -4695,18 +4650,21 @@
         <p:nvCxnSpPr>
           <p:cNvPr id="88" name="Elbow Connector 63"/>
           <p:cNvCxnSpPr>
-            <a:stCxn id="2" idx="3"/>
+            <a:cxnSpLocks/>
+            <a:stCxn id="2" idx="1"/>
             <a:endCxn id="16" idx="3"/>
           </p:cNvCxnSpPr>
           <p:nvPr/>
         </p:nvCxnSpPr>
         <p:spPr>
-          <a:xfrm flipV="1">
-            <a:off x="3189583" y="2286000"/>
-            <a:ext cx="2340386" cy="228600"/>
-          </a:xfrm>
-          <a:prstGeom prst="bentConnector2">
-            <a:avLst/>
+          <a:xfrm rot="10800000" flipV="1">
+            <a:off x="1835828" y="2514599"/>
+            <a:ext cx="260120" cy="1943831"/>
+          </a:xfrm>
+          <a:prstGeom prst="bentConnector3">
+            <a:avLst>
+              <a:gd name="adj1" fmla="val 50000"/>
+            </a:avLst>
           </a:prstGeom>
           <a:ln w="6350">
             <a:solidFill>
@@ -4736,18 +4694,21 @@
         <p:nvCxnSpPr>
           <p:cNvPr id="91" name="Elbow Connector 63"/>
           <p:cNvCxnSpPr>
+            <a:cxnSpLocks/>
             <a:stCxn id="16" idx="3"/>
-            <a:endCxn id="35" idx="3"/>
+            <a:endCxn id="114" idx="1"/>
           </p:cNvCxnSpPr>
           <p:nvPr/>
         </p:nvCxnSpPr>
         <p:spPr>
-          <a:xfrm rot="5400000">
-            <a:off x="3409976" y="2562187"/>
-            <a:ext cx="2396180" cy="1843807"/>
-          </a:xfrm>
-          <a:prstGeom prst="bentConnector2">
-            <a:avLst/>
+          <a:xfrm>
+            <a:off x="1835828" y="4458431"/>
+            <a:ext cx="766939" cy="977345"/>
+          </a:xfrm>
+          <a:prstGeom prst="bentConnector3">
+            <a:avLst>
+              <a:gd name="adj1" fmla="val 17213"/>
+            </a:avLst>
           </a:prstGeom>
           <a:ln w="6350">
             <a:solidFill>
@@ -4777,18 +4738,21 @@
         <p:nvCxnSpPr>
           <p:cNvPr id="94" name="Elbow Connector 63"/>
           <p:cNvCxnSpPr>
+            <a:cxnSpLocks/>
             <a:stCxn id="16" idx="3"/>
-            <a:endCxn id="38" idx="3"/>
+            <a:endCxn id="115" idx="1"/>
           </p:cNvCxnSpPr>
           <p:nvPr/>
         </p:nvCxnSpPr>
         <p:spPr>
-          <a:xfrm rot="5400000">
-            <a:off x="3208856" y="2763307"/>
-            <a:ext cx="2798421" cy="1843806"/>
-          </a:xfrm>
-          <a:prstGeom prst="bentConnector2">
-            <a:avLst/>
+          <a:xfrm>
+            <a:off x="1835828" y="4458431"/>
+            <a:ext cx="766744" cy="1383189"/>
+          </a:xfrm>
+          <a:prstGeom prst="bentConnector3">
+            <a:avLst>
+              <a:gd name="adj1" fmla="val 17204"/>
+            </a:avLst>
           </a:prstGeom>
           <a:ln w="6350">
             <a:solidFill>
@@ -4818,6 +4782,7 @@
         <p:nvCxnSpPr>
           <p:cNvPr id="107" name="Elbow Connector 106"/>
           <p:cNvCxnSpPr>
+            <a:cxnSpLocks/>
             <a:stCxn id="9" idx="0"/>
           </p:cNvCxnSpPr>
           <p:nvPr/>
@@ -4922,9 +4887,9 @@
           <p:nvPr/>
         </p:nvSpPr>
         <p:spPr>
-          <a:xfrm rot="16200000">
-            <a:off x="956202" y="2861202"/>
-            <a:ext cx="1093635" cy="346760"/>
+          <a:xfrm>
+            <a:off x="838199" y="2478308"/>
+            <a:ext cx="1017021" cy="346760"/>
           </a:xfrm>
           <a:prstGeom prst="rect">
             <a:avLst/>
@@ -5077,61 +5042,23 @@
       </p:cxnSp>
       <p:cxnSp>
         <p:nvCxnSpPr>
-          <p:cNvPr id="131" name="Elbow Connector 130"/>
+          <p:cNvPr id="132" name="Elbow Connector 63"/>
           <p:cNvCxnSpPr>
-            <a:stCxn id="39" idx="2"/>
-            <a:endCxn id="43" idx="1"/>
+            <a:cxnSpLocks/>
+            <a:stCxn id="16" idx="3"/>
+            <a:endCxn id="83" idx="1"/>
           </p:cNvCxnSpPr>
           <p:nvPr/>
         </p:nvCxnSpPr>
         <p:spPr>
-          <a:xfrm rot="16200000" flipH="1">
-            <a:off x="2226110" y="3058040"/>
-            <a:ext cx="554704" cy="174673"/>
-          </a:xfrm>
-          <a:prstGeom prst="bentConnector2">
-            <a:avLst/>
-          </a:prstGeom>
-          <a:ln w="19050">
-            <a:solidFill>
-              <a:schemeClr val="accent3"/>
-            </a:solidFill>
-            <a:headEnd type="none" w="med" len="med"/>
-            <a:tailEnd type="arrow" w="med" len="med"/>
-          </a:ln>
-          <a:effectLst/>
-        </p:spPr>
-        <p:style>
-          <a:lnRef idx="1">
-            <a:schemeClr val="accent2"/>
-          </a:lnRef>
-          <a:fillRef idx="2">
-            <a:schemeClr val="accent2"/>
-          </a:fillRef>
-          <a:effectRef idx="1">
-            <a:schemeClr val="accent2"/>
-          </a:effectRef>
-          <a:fontRef idx="minor">
-            <a:schemeClr val="dk1"/>
-          </a:fontRef>
-        </p:style>
-      </p:cxnSp>
-      <p:cxnSp>
-        <p:nvCxnSpPr>
-          <p:cNvPr id="132" name="Elbow Connector 63"/>
-          <p:cNvCxnSpPr>
-            <a:stCxn id="16" idx="3"/>
-            <a:endCxn id="3" idx="3"/>
-          </p:cNvCxnSpPr>
-          <p:nvPr/>
-        </p:nvCxnSpPr>
-        <p:spPr>
-          <a:xfrm rot="5400000">
-            <a:off x="4205956" y="1766207"/>
-            <a:ext cx="804221" cy="1843806"/>
-          </a:xfrm>
-          <a:prstGeom prst="bentConnector2">
-            <a:avLst/>
+          <a:xfrm flipV="1">
+            <a:off x="1835828" y="3143796"/>
+            <a:ext cx="746180" cy="1314635"/>
+          </a:xfrm>
+          <a:prstGeom prst="bentConnector3">
+            <a:avLst>
+              <a:gd name="adj1" fmla="val 17322"/>
+            </a:avLst>
           </a:prstGeom>
           <a:ln w="6350">
             <a:solidFill>
@@ -5161,18 +5088,21 @@
         <p:nvCxnSpPr>
           <p:cNvPr id="137" name="Elbow Connector 136"/>
           <p:cNvCxnSpPr>
-            <a:stCxn id="36" idx="2"/>
+            <a:cxnSpLocks/>
+            <a:stCxn id="36" idx="3"/>
             <a:endCxn id="37" idx="1"/>
           </p:cNvCxnSpPr>
           <p:nvPr/>
         </p:nvCxnSpPr>
         <p:spPr>
-          <a:xfrm rot="16200000" flipH="1">
-            <a:off x="3430123" y="3938021"/>
-            <a:ext cx="118421" cy="699979"/>
-          </a:xfrm>
-          <a:prstGeom prst="bentConnector2">
-            <a:avLst/>
+          <a:xfrm flipV="1">
+            <a:off x="4372033" y="4147023"/>
+            <a:ext cx="504767" cy="226"/>
+          </a:xfrm>
+          <a:prstGeom prst="bentConnector3">
+            <a:avLst>
+              <a:gd name="adj1" fmla="val 50000"/>
+            </a:avLst>
           </a:prstGeom>
           <a:ln w="19050">
             <a:solidFill>
@@ -5202,18 +5132,21 @@
         <p:nvCxnSpPr>
           <p:cNvPr id="140" name="Elbow Connector 63"/>
           <p:cNvCxnSpPr>
+            <a:cxnSpLocks/>
             <a:stCxn id="16" idx="3"/>
-            <a:endCxn id="36" idx="3"/>
+            <a:endCxn id="106" idx="1"/>
           </p:cNvCxnSpPr>
           <p:nvPr/>
         </p:nvCxnSpPr>
         <p:spPr>
-          <a:xfrm rot="5400000">
-            <a:off x="3695875" y="2276286"/>
-            <a:ext cx="1824381" cy="1843808"/>
-          </a:xfrm>
-          <a:prstGeom prst="bentConnector2">
-            <a:avLst/>
+          <a:xfrm flipV="1">
+            <a:off x="1835828" y="4271715"/>
+            <a:ext cx="1448028" cy="186716"/>
+          </a:xfrm>
+          <a:prstGeom prst="bentConnector3">
+            <a:avLst>
+              <a:gd name="adj1" fmla="val 8954"/>
+            </a:avLst>
           </a:prstGeom>
           <a:ln w="6350">
             <a:solidFill>
@@ -5247,7 +5180,7 @@
         </p:nvSpPr>
         <p:spPr>
           <a:xfrm>
-            <a:off x="5435896" y="2743200"/>
+            <a:off x="2105484" y="3078951"/>
             <a:ext cx="229325" cy="166560"/>
           </a:xfrm>
           <a:prstGeom prst="rect">
@@ -5382,7 +5315,7 @@
         </p:nvSpPr>
         <p:spPr>
           <a:xfrm>
-            <a:off x="5431573" y="4488138"/>
+            <a:off x="2101028" y="4564338"/>
             <a:ext cx="229325" cy="160062"/>
           </a:xfrm>
           <a:prstGeom prst="rect">
@@ -5429,58 +5362,875 @@
       </p:sp>
       <p:sp>
         <p:nvSpPr>
-          <p:cNvPr id="118" name="Freeform 117"/>
+          <p:cNvPr id="83" name="Rectangle 82">
+            <a:extLst>
+              <a:ext uri="{FF2B5EF4-FFF2-40B4-BE49-F238E27FC236}">
+                <a16:creationId xmlns:a16="http://schemas.microsoft.com/office/drawing/2014/main" id="{F3061367-A9DF-4A8D-9A3A-31672D54E170}"/>
+              </a:ext>
+            </a:extLst>
+          </p:cNvPr>
           <p:cNvSpPr/>
           <p:nvPr/>
         </p:nvSpPr>
         <p:spPr>
-          <a:xfrm flipV="1">
-            <a:off x="4114799" y="4472708"/>
-            <a:ext cx="2642195" cy="101600"/>
-          </a:xfrm>
-          <a:custGeom>
+          <a:xfrm>
+            <a:off x="2582008" y="3078951"/>
+            <a:ext cx="119742" cy="129690"/>
+          </a:xfrm>
+          <a:prstGeom prst="rect">
             <a:avLst/>
-            <a:gdLst>
-              <a:gd name="connsiteX0" fmla="*/ 0 w 3048000"/>
-              <a:gd name="connsiteY0" fmla="*/ 203200 h 203200"/>
-              <a:gd name="connsiteX1" fmla="*/ 221673 w 3048000"/>
-              <a:gd name="connsiteY1" fmla="*/ 0 h 203200"/>
-              <a:gd name="connsiteX2" fmla="*/ 3048000 w 3048000"/>
-              <a:gd name="connsiteY2" fmla="*/ 0 h 203200"/>
-            </a:gdLst>
-            <a:ahLst/>
-            <a:cxnLst>
-              <a:cxn ang="0">
-                <a:pos x="connsiteX0" y="connsiteY0"/>
-              </a:cxn>
-              <a:cxn ang="0">
-                <a:pos x="connsiteX1" y="connsiteY1"/>
-              </a:cxn>
-              <a:cxn ang="0">
-                <a:pos x="connsiteX2" y="connsiteY2"/>
-              </a:cxn>
-            </a:cxnLst>
-            <a:rect l="l" t="t" r="r" b="b"/>
-            <a:pathLst>
-              <a:path w="3048000" h="203200">
-                <a:moveTo>
-                  <a:pt x="0" y="203200"/>
-                </a:moveTo>
-                <a:lnTo>
-                  <a:pt x="221673" y="0"/>
-                </a:lnTo>
-                <a:lnTo>
-                  <a:pt x="3048000" y="0"/>
-                </a:lnTo>
-              </a:path>
-            </a:pathLst>
-          </a:custGeom>
-          <a:noFill/>
+          </a:prstGeom>
+          <a:solidFill>
+            <a:srgbClr val="000000">
+              <a:alpha val="0"/>
+            </a:srgbClr>
+          </a:solidFill>
+          <a:ln>
+            <a:noFill/>
+          </a:ln>
+        </p:spPr>
+        <p:style>
+          <a:lnRef idx="2">
+            <a:schemeClr val="accent1">
+              <a:shade val="50000"/>
+            </a:schemeClr>
+          </a:lnRef>
+          <a:fillRef idx="1">
+            <a:schemeClr val="accent1"/>
+          </a:fillRef>
+          <a:effectRef idx="0">
+            <a:schemeClr val="accent1"/>
+          </a:effectRef>
+          <a:fontRef idx="minor">
+            <a:schemeClr val="lt1"/>
+          </a:fontRef>
+        </p:style>
+        <p:txBody>
+          <a:bodyPr rtlCol="0" anchor="ctr"/>
+          <a:lstStyle/>
+          <a:p>
+            <a:pPr algn="ctr"/>
+            <a:endParaRPr lang="en-SG"/>
+          </a:p>
+        </p:txBody>
+      </p:sp>
+      <p:sp>
+        <p:nvSpPr>
+          <p:cNvPr id="104" name="Rectangle 103">
+            <a:extLst>
+              <a:ext uri="{FF2B5EF4-FFF2-40B4-BE49-F238E27FC236}">
+                <a16:creationId xmlns:a16="http://schemas.microsoft.com/office/drawing/2014/main" id="{D9C1A33B-A530-4920-A3F8-870E3EF476C0}"/>
+              </a:ext>
+            </a:extLst>
+          </p:cNvPr>
+          <p:cNvSpPr/>
+          <p:nvPr/>
+        </p:nvSpPr>
+        <p:spPr>
+          <a:xfrm>
+            <a:off x="2590796" y="3420750"/>
+            <a:ext cx="119742" cy="129690"/>
+          </a:xfrm>
+          <a:prstGeom prst="rect">
+            <a:avLst/>
+          </a:prstGeom>
+          <a:solidFill>
+            <a:srgbClr val="000000">
+              <a:alpha val="0"/>
+            </a:srgbClr>
+          </a:solidFill>
+          <a:ln>
+            <a:noFill/>
+          </a:ln>
+        </p:spPr>
+        <p:style>
+          <a:lnRef idx="2">
+            <a:schemeClr val="accent1">
+              <a:shade val="50000"/>
+            </a:schemeClr>
+          </a:lnRef>
+          <a:fillRef idx="1">
+            <a:schemeClr val="accent1"/>
+          </a:fillRef>
+          <a:effectRef idx="0">
+            <a:schemeClr val="accent1"/>
+          </a:effectRef>
+          <a:fontRef idx="minor">
+            <a:schemeClr val="lt1"/>
+          </a:fontRef>
+        </p:style>
+        <p:txBody>
+          <a:bodyPr rtlCol="0" anchor="ctr"/>
+          <a:lstStyle/>
+          <a:p>
+            <a:pPr algn="ctr"/>
+            <a:endParaRPr lang="en-SG"/>
+          </a:p>
+        </p:txBody>
+      </p:sp>
+      <p:sp>
+        <p:nvSpPr>
+          <p:cNvPr id="105" name="Rectangle 104">
+            <a:extLst>
+              <a:ext uri="{FF2B5EF4-FFF2-40B4-BE49-F238E27FC236}">
+                <a16:creationId xmlns:a16="http://schemas.microsoft.com/office/drawing/2014/main" id="{2592DDFE-40DE-421B-9F37-29D9B660D5B8}"/>
+              </a:ext>
+            </a:extLst>
+          </p:cNvPr>
+          <p:cNvSpPr/>
+          <p:nvPr/>
+        </p:nvSpPr>
+        <p:spPr>
+          <a:xfrm>
+            <a:off x="2594576" y="3764691"/>
+            <a:ext cx="119742" cy="129690"/>
+          </a:xfrm>
+          <a:prstGeom prst="rect">
+            <a:avLst/>
+          </a:prstGeom>
+          <a:solidFill>
+            <a:srgbClr val="000000">
+              <a:alpha val="0"/>
+            </a:srgbClr>
+          </a:solidFill>
+          <a:ln>
+            <a:noFill/>
+          </a:ln>
+        </p:spPr>
+        <p:style>
+          <a:lnRef idx="2">
+            <a:schemeClr val="accent1">
+              <a:shade val="50000"/>
+            </a:schemeClr>
+          </a:lnRef>
+          <a:fillRef idx="1">
+            <a:schemeClr val="accent1"/>
+          </a:fillRef>
+          <a:effectRef idx="0">
+            <a:schemeClr val="accent1"/>
+          </a:effectRef>
+          <a:fontRef idx="minor">
+            <a:schemeClr val="lt1"/>
+          </a:fontRef>
+        </p:style>
+        <p:txBody>
+          <a:bodyPr rtlCol="0" anchor="ctr"/>
+          <a:lstStyle/>
+          <a:p>
+            <a:pPr algn="ctr"/>
+            <a:endParaRPr lang="en-SG"/>
+          </a:p>
+        </p:txBody>
+      </p:sp>
+      <p:sp>
+        <p:nvSpPr>
+          <p:cNvPr id="106" name="Rectangle 105">
+            <a:extLst>
+              <a:ext uri="{FF2B5EF4-FFF2-40B4-BE49-F238E27FC236}">
+                <a16:creationId xmlns:a16="http://schemas.microsoft.com/office/drawing/2014/main" id="{0FC4D64D-371C-4F76-A2C6-DFD8CCB8C53F}"/>
+              </a:ext>
+            </a:extLst>
+          </p:cNvPr>
+          <p:cNvSpPr/>
+          <p:nvPr/>
+        </p:nvSpPr>
+        <p:spPr>
+          <a:xfrm>
+            <a:off x="3283856" y="4206870"/>
+            <a:ext cx="119742" cy="129690"/>
+          </a:xfrm>
+          <a:prstGeom prst="rect">
+            <a:avLst/>
+          </a:prstGeom>
+          <a:solidFill>
+            <a:srgbClr val="000000">
+              <a:alpha val="0"/>
+            </a:srgbClr>
+          </a:solidFill>
+          <a:ln>
+            <a:noFill/>
+          </a:ln>
+        </p:spPr>
+        <p:style>
+          <a:lnRef idx="2">
+            <a:schemeClr val="accent1">
+              <a:shade val="50000"/>
+            </a:schemeClr>
+          </a:lnRef>
+          <a:fillRef idx="1">
+            <a:schemeClr val="accent1"/>
+          </a:fillRef>
+          <a:effectRef idx="0">
+            <a:schemeClr val="accent1"/>
+          </a:effectRef>
+          <a:fontRef idx="minor">
+            <a:schemeClr val="lt1"/>
+          </a:fontRef>
+        </p:style>
+        <p:txBody>
+          <a:bodyPr rtlCol="0" anchor="ctr"/>
+          <a:lstStyle/>
+          <a:p>
+            <a:pPr algn="ctr"/>
+            <a:endParaRPr lang="en-SG"/>
+          </a:p>
+        </p:txBody>
+      </p:sp>
+      <p:sp>
+        <p:nvSpPr>
+          <p:cNvPr id="113" name="Rectangle 112">
+            <a:extLst>
+              <a:ext uri="{FF2B5EF4-FFF2-40B4-BE49-F238E27FC236}">
+                <a16:creationId xmlns:a16="http://schemas.microsoft.com/office/drawing/2014/main" id="{23D38403-592A-4026-9A2F-D3FD5D3FA3A7}"/>
+              </a:ext>
+            </a:extLst>
+          </p:cNvPr>
+          <p:cNvSpPr/>
+          <p:nvPr/>
+        </p:nvSpPr>
+        <p:spPr>
+          <a:xfrm>
+            <a:off x="4905963" y="4271714"/>
+            <a:ext cx="237520" cy="82775"/>
+          </a:xfrm>
+          <a:prstGeom prst="rect">
+            <a:avLst/>
+          </a:prstGeom>
+          <a:solidFill>
+            <a:srgbClr val="000000">
+              <a:alpha val="0"/>
+            </a:srgbClr>
+          </a:solidFill>
+          <a:ln>
+            <a:noFill/>
+          </a:ln>
+        </p:spPr>
+        <p:style>
+          <a:lnRef idx="2">
+            <a:schemeClr val="accent1">
+              <a:shade val="50000"/>
+            </a:schemeClr>
+          </a:lnRef>
+          <a:fillRef idx="1">
+            <a:schemeClr val="accent1"/>
+          </a:fillRef>
+          <a:effectRef idx="0">
+            <a:schemeClr val="accent1"/>
+          </a:effectRef>
+          <a:fontRef idx="minor">
+            <a:schemeClr val="lt1"/>
+          </a:fontRef>
+        </p:style>
+        <p:txBody>
+          <a:bodyPr rtlCol="0" anchor="ctr"/>
+          <a:lstStyle/>
+          <a:p>
+            <a:pPr algn="ctr"/>
+            <a:endParaRPr lang="en-SG"/>
+          </a:p>
+        </p:txBody>
+      </p:sp>
+      <p:sp>
+        <p:nvSpPr>
+          <p:cNvPr id="114" name="Rectangle 113">
+            <a:extLst>
+              <a:ext uri="{FF2B5EF4-FFF2-40B4-BE49-F238E27FC236}">
+                <a16:creationId xmlns:a16="http://schemas.microsoft.com/office/drawing/2014/main" id="{2FEAB915-824D-48EB-8FF6-8F9F3A8FC828}"/>
+              </a:ext>
+            </a:extLst>
+          </p:cNvPr>
+          <p:cNvSpPr/>
+          <p:nvPr/>
+        </p:nvSpPr>
+        <p:spPr>
+          <a:xfrm>
+            <a:off x="2602767" y="5370931"/>
+            <a:ext cx="119742" cy="129690"/>
+          </a:xfrm>
+          <a:prstGeom prst="rect">
+            <a:avLst/>
+          </a:prstGeom>
+          <a:solidFill>
+            <a:srgbClr val="000000">
+              <a:alpha val="0"/>
+            </a:srgbClr>
+          </a:solidFill>
+          <a:ln>
+            <a:noFill/>
+          </a:ln>
+        </p:spPr>
+        <p:style>
+          <a:lnRef idx="2">
+            <a:schemeClr val="accent1">
+              <a:shade val="50000"/>
+            </a:schemeClr>
+          </a:lnRef>
+          <a:fillRef idx="1">
+            <a:schemeClr val="accent1"/>
+          </a:fillRef>
+          <a:effectRef idx="0">
+            <a:schemeClr val="accent1"/>
+          </a:effectRef>
+          <a:fontRef idx="minor">
+            <a:schemeClr val="lt1"/>
+          </a:fontRef>
+        </p:style>
+        <p:txBody>
+          <a:bodyPr rtlCol="0" anchor="ctr"/>
+          <a:lstStyle/>
+          <a:p>
+            <a:pPr algn="ctr"/>
+            <a:endParaRPr lang="en-SG"/>
+          </a:p>
+        </p:txBody>
+      </p:sp>
+      <p:sp>
+        <p:nvSpPr>
+          <p:cNvPr id="115" name="Rectangle 114">
+            <a:extLst>
+              <a:ext uri="{FF2B5EF4-FFF2-40B4-BE49-F238E27FC236}">
+                <a16:creationId xmlns:a16="http://schemas.microsoft.com/office/drawing/2014/main" id="{AB28F21D-BACF-4F66-8F71-2A8AE7746796}"/>
+              </a:ext>
+            </a:extLst>
+          </p:cNvPr>
+          <p:cNvSpPr/>
+          <p:nvPr/>
+        </p:nvSpPr>
+        <p:spPr>
+          <a:xfrm>
+            <a:off x="2602572" y="5776775"/>
+            <a:ext cx="119742" cy="129690"/>
+          </a:xfrm>
+          <a:prstGeom prst="rect">
+            <a:avLst/>
+          </a:prstGeom>
+          <a:solidFill>
+            <a:srgbClr val="000000">
+              <a:alpha val="0"/>
+            </a:srgbClr>
+          </a:solidFill>
+          <a:ln>
+            <a:noFill/>
+          </a:ln>
+        </p:spPr>
+        <p:style>
+          <a:lnRef idx="2">
+            <a:schemeClr val="accent1">
+              <a:shade val="50000"/>
+            </a:schemeClr>
+          </a:lnRef>
+          <a:fillRef idx="1">
+            <a:schemeClr val="accent1"/>
+          </a:fillRef>
+          <a:effectRef idx="0">
+            <a:schemeClr val="accent1"/>
+          </a:effectRef>
+          <a:fontRef idx="minor">
+            <a:schemeClr val="lt1"/>
+          </a:fontRef>
+        </p:style>
+        <p:txBody>
+          <a:bodyPr rtlCol="0" anchor="ctr"/>
+          <a:lstStyle/>
+          <a:p>
+            <a:pPr algn="ctr"/>
+            <a:endParaRPr lang="en-SG"/>
+          </a:p>
+        </p:txBody>
+      </p:sp>
+      <p:sp>
+        <p:nvSpPr>
+          <p:cNvPr id="141" name="Rectangle 140">
+            <a:extLst>
+              <a:ext uri="{FF2B5EF4-FFF2-40B4-BE49-F238E27FC236}">
+                <a16:creationId xmlns:a16="http://schemas.microsoft.com/office/drawing/2014/main" id="{240EF56A-C36B-4485-BFAD-AEC89B0C8FE9}"/>
+              </a:ext>
+            </a:extLst>
+          </p:cNvPr>
+          <p:cNvSpPr/>
+          <p:nvPr/>
+        </p:nvSpPr>
+        <p:spPr>
+          <a:xfrm>
+            <a:off x="2123812" y="5358751"/>
+            <a:ext cx="229325" cy="160062"/>
+          </a:xfrm>
+          <a:prstGeom prst="rect">
+            <a:avLst/>
+          </a:prstGeom>
+          <a:solidFill>
+            <a:schemeClr val="accent3">
+              <a:lumMod val="20000"/>
+              <a:lumOff val="80000"/>
+              <a:alpha val="80000"/>
+            </a:schemeClr>
+          </a:solidFill>
+          <a:ln>
+            <a:noFill/>
+          </a:ln>
+          <a:effectLst>
+            <a:softEdge rad="31750"/>
+          </a:effectLst>
+        </p:spPr>
+        <p:style>
+          <a:lnRef idx="2">
+            <a:schemeClr val="accent1">
+              <a:shade val="50000"/>
+            </a:schemeClr>
+          </a:lnRef>
+          <a:fillRef idx="1">
+            <a:schemeClr val="accent1"/>
+          </a:fillRef>
+          <a:effectRef idx="0">
+            <a:schemeClr val="accent1"/>
+          </a:effectRef>
+          <a:fontRef idx="minor">
+            <a:schemeClr val="lt1"/>
+          </a:fontRef>
+        </p:style>
+        <p:txBody>
+          <a:bodyPr rtlCol="0" anchor="ctr"/>
+          <a:lstStyle/>
+          <a:p>
+            <a:pPr algn="ctr"/>
+            <a:endParaRPr lang="en-SG"/>
+          </a:p>
+        </p:txBody>
+      </p:sp>
+      <p:sp>
+        <p:nvSpPr>
+          <p:cNvPr id="142" name="Rectangle 141">
+            <a:extLst>
+              <a:ext uri="{FF2B5EF4-FFF2-40B4-BE49-F238E27FC236}">
+                <a16:creationId xmlns:a16="http://schemas.microsoft.com/office/drawing/2014/main" id="{CEE30BFF-16BC-43A6-8528-6CA5B03EF872}"/>
+              </a:ext>
+            </a:extLst>
+          </p:cNvPr>
+          <p:cNvSpPr/>
+          <p:nvPr/>
+        </p:nvSpPr>
+        <p:spPr>
+          <a:xfrm>
+            <a:off x="2105483" y="4233298"/>
+            <a:ext cx="229325" cy="160062"/>
+          </a:xfrm>
+          <a:prstGeom prst="rect">
+            <a:avLst/>
+          </a:prstGeom>
+          <a:solidFill>
+            <a:schemeClr val="accent3">
+              <a:lumMod val="20000"/>
+              <a:lumOff val="80000"/>
+              <a:alpha val="80000"/>
+            </a:schemeClr>
+          </a:solidFill>
+          <a:ln>
+            <a:noFill/>
+          </a:ln>
+          <a:effectLst>
+            <a:softEdge rad="31750"/>
+          </a:effectLst>
+        </p:spPr>
+        <p:style>
+          <a:lnRef idx="2">
+            <a:schemeClr val="accent1">
+              <a:shade val="50000"/>
+            </a:schemeClr>
+          </a:lnRef>
+          <a:fillRef idx="1">
+            <a:schemeClr val="accent1"/>
+          </a:fillRef>
+          <a:effectRef idx="0">
+            <a:schemeClr val="accent1"/>
+          </a:effectRef>
+          <a:fontRef idx="minor">
+            <a:schemeClr val="lt1"/>
+          </a:fontRef>
+        </p:style>
+        <p:txBody>
+          <a:bodyPr rtlCol="0" anchor="ctr"/>
+          <a:lstStyle/>
+          <a:p>
+            <a:pPr algn="ctr"/>
+            <a:endParaRPr lang="en-SG"/>
+          </a:p>
+        </p:txBody>
+      </p:sp>
+      <p:sp>
+        <p:nvSpPr>
+          <p:cNvPr id="145" name="Rectangle 144">
+            <a:extLst>
+              <a:ext uri="{FF2B5EF4-FFF2-40B4-BE49-F238E27FC236}">
+                <a16:creationId xmlns:a16="http://schemas.microsoft.com/office/drawing/2014/main" id="{7FBD6933-BF2D-4744-994B-88F31848E50D}"/>
+              </a:ext>
+            </a:extLst>
+          </p:cNvPr>
+          <p:cNvSpPr/>
+          <p:nvPr/>
+        </p:nvSpPr>
+        <p:spPr>
+          <a:xfrm>
+            <a:off x="2100004" y="3769088"/>
+            <a:ext cx="229325" cy="160062"/>
+          </a:xfrm>
+          <a:prstGeom prst="rect">
+            <a:avLst/>
+          </a:prstGeom>
+          <a:solidFill>
+            <a:schemeClr val="accent3">
+              <a:lumMod val="20000"/>
+              <a:lumOff val="80000"/>
+              <a:alpha val="80000"/>
+            </a:schemeClr>
+          </a:solidFill>
+          <a:ln>
+            <a:noFill/>
+          </a:ln>
+          <a:effectLst>
+            <a:softEdge rad="31750"/>
+          </a:effectLst>
+        </p:spPr>
+        <p:style>
+          <a:lnRef idx="2">
+            <a:schemeClr val="accent1">
+              <a:shade val="50000"/>
+            </a:schemeClr>
+          </a:lnRef>
+          <a:fillRef idx="1">
+            <a:schemeClr val="accent1"/>
+          </a:fillRef>
+          <a:effectRef idx="0">
+            <a:schemeClr val="accent1"/>
+          </a:effectRef>
+          <a:fontRef idx="minor">
+            <a:schemeClr val="lt1"/>
+          </a:fontRef>
+        </p:style>
+        <p:txBody>
+          <a:bodyPr rtlCol="0" anchor="ctr"/>
+          <a:lstStyle/>
+          <a:p>
+            <a:pPr algn="ctr"/>
+            <a:endParaRPr lang="en-SG"/>
+          </a:p>
+        </p:txBody>
+      </p:sp>
+      <p:sp>
+        <p:nvSpPr>
+          <p:cNvPr id="146" name="Rectangle 145">
+            <a:extLst>
+              <a:ext uri="{FF2B5EF4-FFF2-40B4-BE49-F238E27FC236}">
+                <a16:creationId xmlns:a16="http://schemas.microsoft.com/office/drawing/2014/main" id="{617E0A68-92B7-4A04-9090-FC5B3DAA9579}"/>
+              </a:ext>
+            </a:extLst>
+          </p:cNvPr>
+          <p:cNvSpPr/>
+          <p:nvPr/>
+        </p:nvSpPr>
+        <p:spPr>
+          <a:xfrm>
+            <a:off x="2101095" y="3389369"/>
+            <a:ext cx="229325" cy="160062"/>
+          </a:xfrm>
+          <a:prstGeom prst="rect">
+            <a:avLst/>
+          </a:prstGeom>
+          <a:solidFill>
+            <a:schemeClr val="accent3">
+              <a:lumMod val="20000"/>
+              <a:lumOff val="80000"/>
+              <a:alpha val="80000"/>
+            </a:schemeClr>
+          </a:solidFill>
+          <a:ln>
+            <a:noFill/>
+          </a:ln>
+          <a:effectLst>
+            <a:softEdge rad="31750"/>
+          </a:effectLst>
+        </p:spPr>
+        <p:style>
+          <a:lnRef idx="2">
+            <a:schemeClr val="accent1">
+              <a:shade val="50000"/>
+            </a:schemeClr>
+          </a:lnRef>
+          <a:fillRef idx="1">
+            <a:schemeClr val="accent1"/>
+          </a:fillRef>
+          <a:effectRef idx="0">
+            <a:schemeClr val="accent1"/>
+          </a:effectRef>
+          <a:fontRef idx="minor">
+            <a:schemeClr val="lt1"/>
+          </a:fontRef>
+        </p:style>
+        <p:txBody>
+          <a:bodyPr rtlCol="0" anchor="ctr"/>
+          <a:lstStyle/>
+          <a:p>
+            <a:pPr algn="ctr"/>
+            <a:endParaRPr lang="en-SG"/>
+          </a:p>
+        </p:txBody>
+      </p:sp>
+      <p:sp>
+        <p:nvSpPr>
+          <p:cNvPr id="147" name="Rectangle 146">
+            <a:extLst>
+              <a:ext uri="{FF2B5EF4-FFF2-40B4-BE49-F238E27FC236}">
+                <a16:creationId xmlns:a16="http://schemas.microsoft.com/office/drawing/2014/main" id="{93520F91-1578-48F1-BE8E-7F3438ADB2E0}"/>
+              </a:ext>
+            </a:extLst>
+          </p:cNvPr>
+          <p:cNvSpPr/>
+          <p:nvPr/>
+        </p:nvSpPr>
+        <p:spPr>
+          <a:xfrm>
+            <a:off x="2334816" y="3081548"/>
+            <a:ext cx="169480" cy="151389"/>
+          </a:xfrm>
+          <a:prstGeom prst="rect">
+            <a:avLst/>
+          </a:prstGeom>
+          <a:solidFill>
+            <a:schemeClr val="accent3">
+              <a:lumMod val="20000"/>
+              <a:lumOff val="80000"/>
+              <a:alpha val="80000"/>
+            </a:schemeClr>
+          </a:solidFill>
+          <a:ln>
+            <a:noFill/>
+          </a:ln>
+          <a:effectLst>
+            <a:softEdge rad="31750"/>
+          </a:effectLst>
+        </p:spPr>
+        <p:style>
+          <a:lnRef idx="2">
+            <a:schemeClr val="accent1">
+              <a:shade val="50000"/>
+            </a:schemeClr>
+          </a:lnRef>
+          <a:fillRef idx="1">
+            <a:schemeClr val="accent1"/>
+          </a:fillRef>
+          <a:effectRef idx="0">
+            <a:schemeClr val="accent1"/>
+          </a:effectRef>
+          <a:fontRef idx="minor">
+            <a:schemeClr val="lt1"/>
+          </a:fontRef>
+        </p:style>
+        <p:txBody>
+          <a:bodyPr rtlCol="0" anchor="ctr"/>
+          <a:lstStyle/>
+          <a:p>
+            <a:pPr algn="ctr"/>
+            <a:endParaRPr lang="en-SG"/>
+          </a:p>
+        </p:txBody>
+      </p:sp>
+      <p:sp>
+        <p:nvSpPr>
+          <p:cNvPr id="148" name="Rectangle 147">
+            <a:extLst>
+              <a:ext uri="{FF2B5EF4-FFF2-40B4-BE49-F238E27FC236}">
+                <a16:creationId xmlns:a16="http://schemas.microsoft.com/office/drawing/2014/main" id="{C660C41B-448A-47F4-93A4-4CB9EF48F1CA}"/>
+              </a:ext>
+            </a:extLst>
+          </p:cNvPr>
+          <p:cNvSpPr/>
+          <p:nvPr/>
+        </p:nvSpPr>
+        <p:spPr>
+          <a:xfrm>
+            <a:off x="2329268" y="4215248"/>
+            <a:ext cx="169480" cy="145483"/>
+          </a:xfrm>
+          <a:prstGeom prst="rect">
+            <a:avLst/>
+          </a:prstGeom>
+          <a:solidFill>
+            <a:schemeClr val="accent3">
+              <a:lumMod val="20000"/>
+              <a:lumOff val="80000"/>
+              <a:alpha val="80000"/>
+            </a:schemeClr>
+          </a:solidFill>
+          <a:ln>
+            <a:noFill/>
+          </a:ln>
+          <a:effectLst>
+            <a:softEdge rad="31750"/>
+          </a:effectLst>
+        </p:spPr>
+        <p:style>
+          <a:lnRef idx="2">
+            <a:schemeClr val="accent1">
+              <a:shade val="50000"/>
+            </a:schemeClr>
+          </a:lnRef>
+          <a:fillRef idx="1">
+            <a:schemeClr val="accent1"/>
+          </a:fillRef>
+          <a:effectRef idx="0">
+            <a:schemeClr val="accent1"/>
+          </a:effectRef>
+          <a:fontRef idx="minor">
+            <a:schemeClr val="lt1"/>
+          </a:fontRef>
+        </p:style>
+        <p:txBody>
+          <a:bodyPr rtlCol="0" anchor="ctr"/>
+          <a:lstStyle/>
+          <a:p>
+            <a:pPr algn="ctr"/>
+            <a:endParaRPr lang="en-SG"/>
+          </a:p>
+        </p:txBody>
+      </p:sp>
+      <p:sp>
+        <p:nvSpPr>
+          <p:cNvPr id="149" name="Rectangle 148">
+            <a:extLst>
+              <a:ext uri="{FF2B5EF4-FFF2-40B4-BE49-F238E27FC236}">
+                <a16:creationId xmlns:a16="http://schemas.microsoft.com/office/drawing/2014/main" id="{DC1713A9-7CFD-4291-99B6-FB0711D360E9}"/>
+              </a:ext>
+            </a:extLst>
+          </p:cNvPr>
+          <p:cNvSpPr/>
+          <p:nvPr/>
+        </p:nvSpPr>
+        <p:spPr>
+          <a:xfrm>
+            <a:off x="2329336" y="3771093"/>
+            <a:ext cx="169480" cy="145483"/>
+          </a:xfrm>
+          <a:prstGeom prst="rect">
+            <a:avLst/>
+          </a:prstGeom>
+          <a:solidFill>
+            <a:schemeClr val="accent3">
+              <a:lumMod val="20000"/>
+              <a:lumOff val="80000"/>
+              <a:alpha val="80000"/>
+            </a:schemeClr>
+          </a:solidFill>
+          <a:ln>
+            <a:noFill/>
+          </a:ln>
+          <a:effectLst>
+            <a:softEdge rad="31750"/>
+          </a:effectLst>
+        </p:spPr>
+        <p:style>
+          <a:lnRef idx="2">
+            <a:schemeClr val="accent1">
+              <a:shade val="50000"/>
+            </a:schemeClr>
+          </a:lnRef>
+          <a:fillRef idx="1">
+            <a:schemeClr val="accent1"/>
+          </a:fillRef>
+          <a:effectRef idx="0">
+            <a:schemeClr val="accent1"/>
+          </a:effectRef>
+          <a:fontRef idx="minor">
+            <a:schemeClr val="lt1"/>
+          </a:fontRef>
+        </p:style>
+        <p:txBody>
+          <a:bodyPr rtlCol="0" anchor="ctr"/>
+          <a:lstStyle/>
+          <a:p>
+            <a:pPr algn="ctr"/>
+            <a:endParaRPr lang="en-SG"/>
+          </a:p>
+        </p:txBody>
+      </p:sp>
+      <p:sp>
+        <p:nvSpPr>
+          <p:cNvPr id="150" name="Rectangle 149">
+            <a:extLst>
+              <a:ext uri="{FF2B5EF4-FFF2-40B4-BE49-F238E27FC236}">
+                <a16:creationId xmlns:a16="http://schemas.microsoft.com/office/drawing/2014/main" id="{1BDC0119-7BCF-4DEB-9A47-AEA2E4ACA52B}"/>
+              </a:ext>
+            </a:extLst>
+          </p:cNvPr>
+          <p:cNvSpPr/>
+          <p:nvPr/>
+        </p:nvSpPr>
+        <p:spPr>
+          <a:xfrm>
+            <a:off x="2327607" y="3406169"/>
+            <a:ext cx="169480" cy="145483"/>
+          </a:xfrm>
+          <a:prstGeom prst="rect">
+            <a:avLst/>
+          </a:prstGeom>
+          <a:solidFill>
+            <a:schemeClr val="accent3">
+              <a:lumMod val="20000"/>
+              <a:lumOff val="80000"/>
+              <a:alpha val="80000"/>
+            </a:schemeClr>
+          </a:solidFill>
+          <a:ln>
+            <a:noFill/>
+          </a:ln>
+          <a:effectLst>
+            <a:softEdge rad="31750"/>
+          </a:effectLst>
+        </p:spPr>
+        <p:style>
+          <a:lnRef idx="2">
+            <a:schemeClr val="accent1">
+              <a:shade val="50000"/>
+            </a:schemeClr>
+          </a:lnRef>
+          <a:fillRef idx="1">
+            <a:schemeClr val="accent1"/>
+          </a:fillRef>
+          <a:effectRef idx="0">
+            <a:schemeClr val="accent1"/>
+          </a:effectRef>
+          <a:fontRef idx="minor">
+            <a:schemeClr val="lt1"/>
+          </a:fontRef>
+        </p:style>
+        <p:txBody>
+          <a:bodyPr rtlCol="0" anchor="ctr"/>
+          <a:lstStyle/>
+          <a:p>
+            <a:pPr algn="ctr"/>
+            <a:endParaRPr lang="en-SG"/>
+          </a:p>
+        </p:txBody>
+      </p:sp>
+      <p:cxnSp>
+        <p:nvCxnSpPr>
+          <p:cNvPr id="50" name="Elbow Connector 63"/>
+          <p:cNvCxnSpPr>
+            <a:stCxn id="39" idx="2"/>
+            <a:endCxn id="35" idx="1"/>
+          </p:cNvCxnSpPr>
+          <p:nvPr/>
+        </p:nvCxnSpPr>
+        <p:spPr>
+          <a:xfrm rot="16200000" flipH="1">
+            <a:off x="1252134" y="4032017"/>
+            <a:ext cx="2516650" cy="188666"/>
+          </a:xfrm>
+          <a:prstGeom prst="bentConnector2">
+            <a:avLst/>
+          </a:prstGeom>
           <a:ln w="19050">
             <a:solidFill>
               <a:schemeClr val="accent3"/>
             </a:solidFill>
-            <a:prstDash val="sysDot"/>
             <a:headEnd type="none" w="med" len="med"/>
             <a:tailEnd type="arrow" w="med" len="med"/>
           </a:ln>
@@ -5500,6 +6250,387 @@
             <a:schemeClr val="dk1"/>
           </a:fontRef>
         </p:style>
+      </p:cxnSp>
+      <p:cxnSp>
+        <p:nvCxnSpPr>
+          <p:cNvPr id="131" name="Elbow Connector 130"/>
+          <p:cNvCxnSpPr>
+            <a:stCxn id="39" idx="2"/>
+            <a:endCxn id="43" idx="1"/>
+          </p:cNvCxnSpPr>
+          <p:nvPr/>
+        </p:nvCxnSpPr>
+        <p:spPr>
+          <a:xfrm rot="16200000" flipH="1">
+            <a:off x="2226110" y="3058040"/>
+            <a:ext cx="554704" cy="174673"/>
+          </a:xfrm>
+          <a:prstGeom prst="bentConnector2">
+            <a:avLst/>
+          </a:prstGeom>
+          <a:ln w="19050">
+            <a:solidFill>
+              <a:schemeClr val="accent3"/>
+            </a:solidFill>
+            <a:headEnd type="none" w="med" len="med"/>
+            <a:tailEnd type="arrow" w="med" len="med"/>
+          </a:ln>
+          <a:effectLst/>
+        </p:spPr>
+        <p:style>
+          <a:lnRef idx="1">
+            <a:schemeClr val="accent2"/>
+          </a:lnRef>
+          <a:fillRef idx="2">
+            <a:schemeClr val="accent2"/>
+          </a:fillRef>
+          <a:effectRef idx="1">
+            <a:schemeClr val="accent2"/>
+          </a:effectRef>
+          <a:fontRef idx="minor">
+            <a:schemeClr val="dk1"/>
+          </a:fontRef>
+        </p:style>
+      </p:cxnSp>
+      <p:sp>
+        <p:nvSpPr>
+          <p:cNvPr id="152" name="Isosceles Triangle 102">
+            <a:extLst>
+              <a:ext uri="{FF2B5EF4-FFF2-40B4-BE49-F238E27FC236}">
+                <a16:creationId xmlns:a16="http://schemas.microsoft.com/office/drawing/2014/main" id="{7A03B3EB-960D-41DD-91B6-46E68CA2D1C1}"/>
+              </a:ext>
+            </a:extLst>
+          </p:cNvPr>
+          <p:cNvSpPr/>
+          <p:nvPr/>
+        </p:nvSpPr>
+        <p:spPr>
+          <a:xfrm rot="10800000" flipV="1">
+            <a:off x="3819725" y="4325560"/>
+            <a:ext cx="270504" cy="175523"/>
+          </a:xfrm>
+          <a:prstGeom prst="triangle">
+            <a:avLst/>
+          </a:prstGeom>
+          <a:solidFill>
+            <a:schemeClr val="accent3"/>
+          </a:solidFill>
+          <a:ln w="6350">
+            <a:solidFill>
+              <a:schemeClr val="accent3"/>
+            </a:solidFill>
+          </a:ln>
+          <a:effectLst/>
+        </p:spPr>
+        <p:style>
+          <a:lnRef idx="1">
+            <a:schemeClr val="accent3"/>
+          </a:lnRef>
+          <a:fillRef idx="2">
+            <a:schemeClr val="accent3"/>
+          </a:fillRef>
+          <a:effectRef idx="1">
+            <a:schemeClr val="accent3"/>
+          </a:effectRef>
+          <a:fontRef idx="minor">
+            <a:schemeClr val="dk1"/>
+          </a:fontRef>
+        </p:style>
+        <p:txBody>
+          <a:bodyPr rtlCol="0" anchor="ctr"/>
+          <a:lstStyle/>
+          <a:p>
+            <a:pPr algn="ctr"/>
+            <a:endParaRPr lang="en-SG" sz="1050" b="1">
+              <a:solidFill>
+                <a:srgbClr val="92D050"/>
+              </a:solidFill>
+            </a:endParaRPr>
+          </a:p>
+        </p:txBody>
+      </p:sp>
+      <p:sp>
+        <p:nvSpPr>
+          <p:cNvPr id="153" name="Isosceles Triangle 102">
+            <a:extLst>
+              <a:ext uri="{FF2B5EF4-FFF2-40B4-BE49-F238E27FC236}">
+                <a16:creationId xmlns:a16="http://schemas.microsoft.com/office/drawing/2014/main" id="{76E96BC9-AF00-4C54-8CEF-E8A4BB781607}"/>
+              </a:ext>
+            </a:extLst>
+          </p:cNvPr>
+          <p:cNvSpPr/>
+          <p:nvPr/>
+        </p:nvSpPr>
+        <p:spPr>
+          <a:xfrm rot="10800000" flipV="1">
+            <a:off x="5188277" y="4347180"/>
+            <a:ext cx="270504" cy="175523"/>
+          </a:xfrm>
+          <a:prstGeom prst="triangle">
+            <a:avLst/>
+          </a:prstGeom>
+          <a:solidFill>
+            <a:schemeClr val="accent3"/>
+          </a:solidFill>
+          <a:ln w="6350">
+            <a:solidFill>
+              <a:schemeClr val="accent3"/>
+            </a:solidFill>
+          </a:ln>
+          <a:effectLst/>
+        </p:spPr>
+        <p:style>
+          <a:lnRef idx="1">
+            <a:schemeClr val="accent3"/>
+          </a:lnRef>
+          <a:fillRef idx="2">
+            <a:schemeClr val="accent3"/>
+          </a:fillRef>
+          <a:effectRef idx="1">
+            <a:schemeClr val="accent3"/>
+          </a:effectRef>
+          <a:fontRef idx="minor">
+            <a:schemeClr val="dk1"/>
+          </a:fontRef>
+        </p:style>
+        <p:txBody>
+          <a:bodyPr rtlCol="0" anchor="ctr"/>
+          <a:lstStyle/>
+          <a:p>
+            <a:pPr algn="ctr"/>
+            <a:endParaRPr lang="en-SG" sz="1050" b="1">
+              <a:solidFill>
+                <a:srgbClr val="92D050"/>
+              </a:solidFill>
+            </a:endParaRPr>
+          </a:p>
+        </p:txBody>
+      </p:sp>
+      <p:sp>
+        <p:nvSpPr>
+          <p:cNvPr id="164" name="Rectangle 11">
+            <a:extLst>
+              <a:ext uri="{FF2B5EF4-FFF2-40B4-BE49-F238E27FC236}">
+                <a16:creationId xmlns:a16="http://schemas.microsoft.com/office/drawing/2014/main" id="{73DB0F12-0248-40BB-A033-00A316246B94}"/>
+              </a:ext>
+            </a:extLst>
+          </p:cNvPr>
+          <p:cNvSpPr/>
+          <p:nvPr/>
+        </p:nvSpPr>
+        <p:spPr>
+          <a:xfrm>
+            <a:off x="2602572" y="4623503"/>
+            <a:ext cx="1093635" cy="236841"/>
+          </a:xfrm>
+          <a:prstGeom prst="rect">
+            <a:avLst/>
+          </a:prstGeom>
+          <a:ln w="19050">
+            <a:solidFill>
+              <a:schemeClr val="accent3"/>
+            </a:solidFill>
+          </a:ln>
+          <a:effectLst/>
+        </p:spPr>
+        <p:style>
+          <a:lnRef idx="1">
+            <a:schemeClr val="accent3"/>
+          </a:lnRef>
+          <a:fillRef idx="2">
+            <a:schemeClr val="accent3"/>
+          </a:fillRef>
+          <a:effectRef idx="1">
+            <a:schemeClr val="accent3"/>
+          </a:effectRef>
+          <a:fontRef idx="minor">
+            <a:schemeClr val="dk1"/>
+          </a:fontRef>
+        </p:style>
+        <p:txBody>
+          <a:bodyPr rtlCol="0" anchor="ctr"/>
+          <a:lstStyle/>
+          <a:p>
+            <a:pPr algn="ctr"/>
+            <a:r>
+              <a:rPr lang="en-US" sz="1050" b="1" dirty="0" err="1">
+                <a:solidFill>
+                  <a:schemeClr val="accent3">
+                    <a:lumMod val="75000"/>
+                  </a:schemeClr>
+                </a:solidFill>
+              </a:rPr>
+              <a:t>BikeListPanel</a:t>
+            </a:r>
+            <a:endParaRPr lang="en-SG" sz="1050" b="1" dirty="0">
+              <a:solidFill>
+                <a:schemeClr val="accent3">
+                  <a:lumMod val="75000"/>
+                </a:schemeClr>
+              </a:solidFill>
+            </a:endParaRPr>
+          </a:p>
+        </p:txBody>
+      </p:sp>
+      <p:sp>
+        <p:nvSpPr>
+          <p:cNvPr id="165" name="Rectangle 11">
+            <a:extLst>
+              <a:ext uri="{FF2B5EF4-FFF2-40B4-BE49-F238E27FC236}">
+                <a16:creationId xmlns:a16="http://schemas.microsoft.com/office/drawing/2014/main" id="{90EF5BB0-D43B-45E5-86E6-99CEE2488F0B}"/>
+              </a:ext>
+            </a:extLst>
+          </p:cNvPr>
+          <p:cNvSpPr/>
+          <p:nvPr/>
+        </p:nvSpPr>
+        <p:spPr>
+          <a:xfrm>
+            <a:off x="2602572" y="4937123"/>
+            <a:ext cx="1093635" cy="236841"/>
+          </a:xfrm>
+          <a:prstGeom prst="rect">
+            <a:avLst/>
+          </a:prstGeom>
+          <a:ln w="19050">
+            <a:solidFill>
+              <a:schemeClr val="accent3"/>
+            </a:solidFill>
+          </a:ln>
+          <a:effectLst/>
+        </p:spPr>
+        <p:style>
+          <a:lnRef idx="1">
+            <a:schemeClr val="accent3"/>
+          </a:lnRef>
+          <a:fillRef idx="2">
+            <a:schemeClr val="accent3"/>
+          </a:fillRef>
+          <a:effectRef idx="1">
+            <a:schemeClr val="accent3"/>
+          </a:effectRef>
+          <a:fontRef idx="minor">
+            <a:schemeClr val="dk1"/>
+          </a:fontRef>
+        </p:style>
+        <p:txBody>
+          <a:bodyPr rtlCol="0" anchor="ctr"/>
+          <a:lstStyle/>
+          <a:p>
+            <a:pPr algn="ctr"/>
+            <a:r>
+              <a:rPr lang="en-US" sz="1050" b="1" dirty="0" err="1">
+                <a:solidFill>
+                  <a:schemeClr val="accent3">
+                    <a:lumMod val="75000"/>
+                  </a:schemeClr>
+                </a:solidFill>
+              </a:rPr>
+              <a:t>LoanListPanel</a:t>
+            </a:r>
+            <a:endParaRPr lang="en-SG" sz="1050" b="1" dirty="0">
+              <a:solidFill>
+                <a:schemeClr val="accent3">
+                  <a:lumMod val="75000"/>
+                </a:schemeClr>
+              </a:solidFill>
+            </a:endParaRPr>
+          </a:p>
+        </p:txBody>
+      </p:sp>
+      <p:cxnSp>
+        <p:nvCxnSpPr>
+          <p:cNvPr id="171" name="Elbow Connector 63">
+            <a:extLst>
+              <a:ext uri="{FF2B5EF4-FFF2-40B4-BE49-F238E27FC236}">
+                <a16:creationId xmlns:a16="http://schemas.microsoft.com/office/drawing/2014/main" id="{F3D00F89-85E7-4A35-90C4-D9F81C8CBDD6}"/>
+              </a:ext>
+            </a:extLst>
+          </p:cNvPr>
+          <p:cNvCxnSpPr>
+            <a:cxnSpLocks/>
+            <a:stCxn id="39" idx="2"/>
+            <a:endCxn id="165" idx="1"/>
+          </p:cNvCxnSpPr>
+          <p:nvPr/>
+        </p:nvCxnSpPr>
+        <p:spPr>
+          <a:xfrm rot="16200000" flipH="1">
+            <a:off x="1415590" y="3868561"/>
+            <a:ext cx="2187519" cy="186446"/>
+          </a:xfrm>
+          <a:prstGeom prst="bentConnector2">
+            <a:avLst/>
+          </a:prstGeom>
+          <a:ln w="19050">
+            <a:solidFill>
+              <a:schemeClr val="accent3"/>
+            </a:solidFill>
+            <a:headEnd type="none" w="med" len="med"/>
+            <a:tailEnd type="arrow" w="med" len="med"/>
+          </a:ln>
+          <a:effectLst/>
+        </p:spPr>
+        <p:style>
+          <a:lnRef idx="1">
+            <a:schemeClr val="accent2"/>
+          </a:lnRef>
+          <a:fillRef idx="2">
+            <a:schemeClr val="accent2"/>
+          </a:fillRef>
+          <a:effectRef idx="1">
+            <a:schemeClr val="accent2"/>
+          </a:effectRef>
+          <a:fontRef idx="minor">
+            <a:schemeClr val="dk1"/>
+          </a:fontRef>
+        </p:style>
+      </p:cxnSp>
+      <p:sp>
+        <p:nvSpPr>
+          <p:cNvPr id="186" name="Rectangle 185">
+            <a:extLst>
+              <a:ext uri="{FF2B5EF4-FFF2-40B4-BE49-F238E27FC236}">
+                <a16:creationId xmlns:a16="http://schemas.microsoft.com/office/drawing/2014/main" id="{85569CDF-426C-4998-99A3-B9518CC12C5F}"/>
+              </a:ext>
+            </a:extLst>
+          </p:cNvPr>
+          <p:cNvSpPr/>
+          <p:nvPr/>
+        </p:nvSpPr>
+        <p:spPr>
+          <a:xfrm>
+            <a:off x="2114170" y="2611492"/>
+            <a:ext cx="237520" cy="82775"/>
+          </a:xfrm>
+          <a:prstGeom prst="rect">
+            <a:avLst/>
+          </a:prstGeom>
+          <a:solidFill>
+            <a:srgbClr val="000000">
+              <a:alpha val="0"/>
+            </a:srgbClr>
+          </a:solidFill>
+          <a:ln>
+            <a:noFill/>
+          </a:ln>
+        </p:spPr>
+        <p:style>
+          <a:lnRef idx="2">
+            <a:schemeClr val="accent1">
+              <a:shade val="50000"/>
+            </a:schemeClr>
+          </a:lnRef>
+          <a:fillRef idx="1">
+            <a:schemeClr val="accent1"/>
+          </a:fillRef>
+          <a:effectRef idx="0">
+            <a:schemeClr val="accent1"/>
+          </a:effectRef>
+          <a:fontRef idx="minor">
+            <a:schemeClr val="lt1"/>
+          </a:fontRef>
+        </p:style>
         <p:txBody>
           <a:bodyPr rtlCol="0" anchor="ctr"/>
           <a:lstStyle/>
@@ -5509,6 +6640,905 @@
           </a:p>
         </p:txBody>
       </p:sp>
+      <p:cxnSp>
+        <p:nvCxnSpPr>
+          <p:cNvPr id="189" name="Elbow Connector 63">
+            <a:extLst>
+              <a:ext uri="{FF2B5EF4-FFF2-40B4-BE49-F238E27FC236}">
+                <a16:creationId xmlns:a16="http://schemas.microsoft.com/office/drawing/2014/main" id="{1E8805D9-6307-4AAD-AF38-8432CCC84D8E}"/>
+              </a:ext>
+            </a:extLst>
+          </p:cNvPr>
+          <p:cNvCxnSpPr>
+            <a:cxnSpLocks/>
+            <a:stCxn id="164" idx="3"/>
+            <a:endCxn id="152" idx="3"/>
+          </p:cNvCxnSpPr>
+          <p:nvPr/>
+        </p:nvCxnSpPr>
+        <p:spPr>
+          <a:xfrm flipV="1">
+            <a:off x="3696207" y="4501083"/>
+            <a:ext cx="258770" cy="240841"/>
+          </a:xfrm>
+          <a:prstGeom prst="bentConnector2">
+            <a:avLst/>
+          </a:prstGeom>
+          <a:ln w="19050">
+            <a:solidFill>
+              <a:schemeClr val="accent3"/>
+            </a:solidFill>
+            <a:headEnd type="none" w="med" len="med"/>
+            <a:tailEnd type="none" w="med" len="med"/>
+          </a:ln>
+          <a:effectLst/>
+        </p:spPr>
+        <p:style>
+          <a:lnRef idx="1">
+            <a:schemeClr val="accent2"/>
+          </a:lnRef>
+          <a:fillRef idx="2">
+            <a:schemeClr val="accent2"/>
+          </a:fillRef>
+          <a:effectRef idx="1">
+            <a:schemeClr val="accent2"/>
+          </a:effectRef>
+          <a:fontRef idx="minor">
+            <a:schemeClr val="dk1"/>
+          </a:fontRef>
+        </p:style>
+      </p:cxnSp>
+      <p:cxnSp>
+        <p:nvCxnSpPr>
+          <p:cNvPr id="192" name="Elbow Connector 63">
+            <a:extLst>
+              <a:ext uri="{FF2B5EF4-FFF2-40B4-BE49-F238E27FC236}">
+                <a16:creationId xmlns:a16="http://schemas.microsoft.com/office/drawing/2014/main" id="{93E17139-0CAB-4F1F-A31C-FFE290F23139}"/>
+              </a:ext>
+            </a:extLst>
+          </p:cNvPr>
+          <p:cNvCxnSpPr>
+            <a:cxnSpLocks/>
+            <a:stCxn id="165" idx="3"/>
+            <a:endCxn id="152" idx="3"/>
+          </p:cNvCxnSpPr>
+          <p:nvPr/>
+        </p:nvCxnSpPr>
+        <p:spPr>
+          <a:xfrm flipV="1">
+            <a:off x="3696207" y="4501083"/>
+            <a:ext cx="258770" cy="554461"/>
+          </a:xfrm>
+          <a:prstGeom prst="bentConnector2">
+            <a:avLst/>
+          </a:prstGeom>
+          <a:ln w="19050">
+            <a:solidFill>
+              <a:schemeClr val="accent3"/>
+            </a:solidFill>
+            <a:headEnd type="none" w="med" len="med"/>
+            <a:tailEnd type="none" w="med" len="med"/>
+          </a:ln>
+          <a:effectLst/>
+        </p:spPr>
+        <p:style>
+          <a:lnRef idx="1">
+            <a:schemeClr val="accent2"/>
+          </a:lnRef>
+          <a:fillRef idx="2">
+            <a:schemeClr val="accent2"/>
+          </a:fillRef>
+          <a:effectRef idx="1">
+            <a:schemeClr val="accent2"/>
+          </a:effectRef>
+          <a:fontRef idx="minor">
+            <a:schemeClr val="dk1"/>
+          </a:fontRef>
+        </p:style>
+      </p:cxnSp>
+      <p:sp>
+        <p:nvSpPr>
+          <p:cNvPr id="210" name="Rectangle 11">
+            <a:extLst>
+              <a:ext uri="{FF2B5EF4-FFF2-40B4-BE49-F238E27FC236}">
+                <a16:creationId xmlns:a16="http://schemas.microsoft.com/office/drawing/2014/main" id="{E0E48002-79E3-464D-A487-29BFA7C91D17}"/>
+              </a:ext>
+            </a:extLst>
+          </p:cNvPr>
+          <p:cNvSpPr/>
+          <p:nvPr/>
+        </p:nvSpPr>
+        <p:spPr>
+          <a:xfrm>
+            <a:off x="4090229" y="4692429"/>
+            <a:ext cx="1093635" cy="236841"/>
+          </a:xfrm>
+          <a:prstGeom prst="rect">
+            <a:avLst/>
+          </a:prstGeom>
+          <a:ln w="19050">
+            <a:solidFill>
+              <a:schemeClr val="accent3"/>
+            </a:solidFill>
+          </a:ln>
+          <a:effectLst/>
+        </p:spPr>
+        <p:style>
+          <a:lnRef idx="1">
+            <a:schemeClr val="accent3"/>
+          </a:lnRef>
+          <a:fillRef idx="2">
+            <a:schemeClr val="accent3"/>
+          </a:fillRef>
+          <a:effectRef idx="1">
+            <a:schemeClr val="accent3"/>
+          </a:effectRef>
+          <a:fontRef idx="minor">
+            <a:schemeClr val="dk1"/>
+          </a:fontRef>
+        </p:style>
+        <p:txBody>
+          <a:bodyPr rtlCol="0" anchor="ctr"/>
+          <a:lstStyle/>
+          <a:p>
+            <a:pPr algn="ctr"/>
+            <a:r>
+              <a:rPr lang="en-US" sz="1050" b="1" dirty="0" err="1">
+                <a:solidFill>
+                  <a:schemeClr val="accent3">
+                    <a:lumMod val="75000"/>
+                  </a:schemeClr>
+                </a:solidFill>
+              </a:rPr>
+              <a:t>BikeCard</a:t>
+            </a:r>
+            <a:endParaRPr lang="en-US" sz="1050" b="1" dirty="0">
+              <a:solidFill>
+                <a:schemeClr val="accent3">
+                  <a:lumMod val="75000"/>
+                </a:schemeClr>
+              </a:solidFill>
+            </a:endParaRPr>
+          </a:p>
+        </p:txBody>
+      </p:sp>
+      <p:sp>
+        <p:nvSpPr>
+          <p:cNvPr id="211" name="Rectangle 11">
+            <a:extLst>
+              <a:ext uri="{FF2B5EF4-FFF2-40B4-BE49-F238E27FC236}">
+                <a16:creationId xmlns:a16="http://schemas.microsoft.com/office/drawing/2014/main" id="{7DADFBFC-913E-4713-9515-EC115FBE2855}"/>
+              </a:ext>
+            </a:extLst>
+          </p:cNvPr>
+          <p:cNvSpPr/>
+          <p:nvPr/>
+        </p:nvSpPr>
+        <p:spPr>
+          <a:xfrm>
+            <a:off x="4090229" y="5031604"/>
+            <a:ext cx="1093635" cy="236841"/>
+          </a:xfrm>
+          <a:prstGeom prst="rect">
+            <a:avLst/>
+          </a:prstGeom>
+          <a:ln w="19050">
+            <a:solidFill>
+              <a:schemeClr val="accent3"/>
+            </a:solidFill>
+          </a:ln>
+          <a:effectLst/>
+        </p:spPr>
+        <p:style>
+          <a:lnRef idx="1">
+            <a:schemeClr val="accent3"/>
+          </a:lnRef>
+          <a:fillRef idx="2">
+            <a:schemeClr val="accent3"/>
+          </a:fillRef>
+          <a:effectRef idx="1">
+            <a:schemeClr val="accent3"/>
+          </a:effectRef>
+          <a:fontRef idx="minor">
+            <a:schemeClr val="dk1"/>
+          </a:fontRef>
+        </p:style>
+        <p:txBody>
+          <a:bodyPr rtlCol="0" anchor="ctr"/>
+          <a:lstStyle/>
+          <a:p>
+            <a:pPr algn="ctr"/>
+            <a:r>
+              <a:rPr lang="en-US" sz="1050" b="1" dirty="0" err="1">
+                <a:solidFill>
+                  <a:schemeClr val="accent3">
+                    <a:lumMod val="75000"/>
+                  </a:schemeClr>
+                </a:solidFill>
+              </a:rPr>
+              <a:t>LoanCard</a:t>
+            </a:r>
+            <a:endParaRPr lang="en-US" sz="1050" b="1" dirty="0">
+              <a:solidFill>
+                <a:schemeClr val="accent3">
+                  <a:lumMod val="75000"/>
+                </a:schemeClr>
+              </a:solidFill>
+            </a:endParaRPr>
+          </a:p>
+        </p:txBody>
+      </p:sp>
+      <p:cxnSp>
+        <p:nvCxnSpPr>
+          <p:cNvPr id="212" name="Elbow Connector 63">
+            <a:extLst>
+              <a:ext uri="{FF2B5EF4-FFF2-40B4-BE49-F238E27FC236}">
+                <a16:creationId xmlns:a16="http://schemas.microsoft.com/office/drawing/2014/main" id="{2043D4BE-0E84-4E33-8546-2C74F702B349}"/>
+              </a:ext>
+            </a:extLst>
+          </p:cNvPr>
+          <p:cNvCxnSpPr>
+            <a:cxnSpLocks/>
+            <a:stCxn id="210" idx="3"/>
+            <a:endCxn id="153" idx="3"/>
+          </p:cNvCxnSpPr>
+          <p:nvPr/>
+        </p:nvCxnSpPr>
+        <p:spPr>
+          <a:xfrm flipV="1">
+            <a:off x="5183864" y="4522703"/>
+            <a:ext cx="139665" cy="288147"/>
+          </a:xfrm>
+          <a:prstGeom prst="bentConnector2">
+            <a:avLst/>
+          </a:prstGeom>
+          <a:ln w="19050">
+            <a:solidFill>
+              <a:schemeClr val="accent3"/>
+            </a:solidFill>
+            <a:headEnd type="none" w="med" len="med"/>
+            <a:tailEnd type="none" w="med" len="med"/>
+          </a:ln>
+          <a:effectLst/>
+        </p:spPr>
+        <p:style>
+          <a:lnRef idx="1">
+            <a:schemeClr val="accent2"/>
+          </a:lnRef>
+          <a:fillRef idx="2">
+            <a:schemeClr val="accent2"/>
+          </a:fillRef>
+          <a:effectRef idx="1">
+            <a:schemeClr val="accent2"/>
+          </a:effectRef>
+          <a:fontRef idx="minor">
+            <a:schemeClr val="dk1"/>
+          </a:fontRef>
+        </p:style>
+      </p:cxnSp>
+      <p:cxnSp>
+        <p:nvCxnSpPr>
+          <p:cNvPr id="215" name="Elbow Connector 63">
+            <a:extLst>
+              <a:ext uri="{FF2B5EF4-FFF2-40B4-BE49-F238E27FC236}">
+                <a16:creationId xmlns:a16="http://schemas.microsoft.com/office/drawing/2014/main" id="{E04D461F-E786-4E69-8C68-F4A48820F21E}"/>
+              </a:ext>
+            </a:extLst>
+          </p:cNvPr>
+          <p:cNvCxnSpPr>
+            <a:cxnSpLocks/>
+            <a:stCxn id="211" idx="3"/>
+            <a:endCxn id="153" idx="3"/>
+          </p:cNvCxnSpPr>
+          <p:nvPr/>
+        </p:nvCxnSpPr>
+        <p:spPr>
+          <a:xfrm flipV="1">
+            <a:off x="5183864" y="4522703"/>
+            <a:ext cx="139665" cy="627322"/>
+          </a:xfrm>
+          <a:prstGeom prst="bentConnector2">
+            <a:avLst/>
+          </a:prstGeom>
+          <a:ln w="19050">
+            <a:solidFill>
+              <a:schemeClr val="accent3"/>
+            </a:solidFill>
+            <a:headEnd type="none" w="med" len="med"/>
+            <a:tailEnd type="none" w="med" len="med"/>
+          </a:ln>
+          <a:effectLst/>
+        </p:spPr>
+        <p:style>
+          <a:lnRef idx="1">
+            <a:schemeClr val="accent2"/>
+          </a:lnRef>
+          <a:fillRef idx="2">
+            <a:schemeClr val="accent2"/>
+          </a:fillRef>
+          <a:effectRef idx="1">
+            <a:schemeClr val="accent2"/>
+          </a:effectRef>
+          <a:fontRef idx="minor">
+            <a:schemeClr val="dk1"/>
+          </a:fontRef>
+        </p:style>
+      </p:cxnSp>
+      <p:sp>
+        <p:nvSpPr>
+          <p:cNvPr id="221" name="Rectangle 220">
+            <a:extLst>
+              <a:ext uri="{FF2B5EF4-FFF2-40B4-BE49-F238E27FC236}">
+                <a16:creationId xmlns:a16="http://schemas.microsoft.com/office/drawing/2014/main" id="{BA771D65-A84E-4884-906B-4626AFAC66C3}"/>
+              </a:ext>
+            </a:extLst>
+          </p:cNvPr>
+          <p:cNvSpPr/>
+          <p:nvPr/>
+        </p:nvSpPr>
+        <p:spPr>
+          <a:xfrm>
+            <a:off x="3566418" y="4741468"/>
+            <a:ext cx="119742" cy="129690"/>
+          </a:xfrm>
+          <a:prstGeom prst="rect">
+            <a:avLst/>
+          </a:prstGeom>
+          <a:solidFill>
+            <a:srgbClr val="000000">
+              <a:alpha val="0"/>
+            </a:srgbClr>
+          </a:solidFill>
+          <a:ln>
+            <a:noFill/>
+          </a:ln>
+        </p:spPr>
+        <p:style>
+          <a:lnRef idx="2">
+            <a:schemeClr val="accent1">
+              <a:shade val="50000"/>
+            </a:schemeClr>
+          </a:lnRef>
+          <a:fillRef idx="1">
+            <a:schemeClr val="accent1"/>
+          </a:fillRef>
+          <a:effectRef idx="0">
+            <a:schemeClr val="accent1"/>
+          </a:effectRef>
+          <a:fontRef idx="minor">
+            <a:schemeClr val="lt1"/>
+          </a:fontRef>
+        </p:style>
+        <p:txBody>
+          <a:bodyPr rtlCol="0" anchor="ctr"/>
+          <a:lstStyle/>
+          <a:p>
+            <a:pPr algn="ctr"/>
+            <a:endParaRPr lang="en-SG"/>
+          </a:p>
+        </p:txBody>
+      </p:sp>
+      <p:sp>
+        <p:nvSpPr>
+          <p:cNvPr id="222" name="Rectangle 221">
+            <a:extLst>
+              <a:ext uri="{FF2B5EF4-FFF2-40B4-BE49-F238E27FC236}">
+                <a16:creationId xmlns:a16="http://schemas.microsoft.com/office/drawing/2014/main" id="{86277747-B6C6-4CAC-9AC9-54F14B26CC75}"/>
+              </a:ext>
+            </a:extLst>
+          </p:cNvPr>
+          <p:cNvSpPr/>
+          <p:nvPr/>
+        </p:nvSpPr>
+        <p:spPr>
+          <a:xfrm>
+            <a:off x="3580002" y="5051234"/>
+            <a:ext cx="119742" cy="129690"/>
+          </a:xfrm>
+          <a:prstGeom prst="rect">
+            <a:avLst/>
+          </a:prstGeom>
+          <a:solidFill>
+            <a:srgbClr val="000000">
+              <a:alpha val="0"/>
+            </a:srgbClr>
+          </a:solidFill>
+          <a:ln>
+            <a:noFill/>
+          </a:ln>
+        </p:spPr>
+        <p:style>
+          <a:lnRef idx="2">
+            <a:schemeClr val="accent1">
+              <a:shade val="50000"/>
+            </a:schemeClr>
+          </a:lnRef>
+          <a:fillRef idx="1">
+            <a:schemeClr val="accent1"/>
+          </a:fillRef>
+          <a:effectRef idx="0">
+            <a:schemeClr val="accent1"/>
+          </a:effectRef>
+          <a:fontRef idx="minor">
+            <a:schemeClr val="lt1"/>
+          </a:fontRef>
+        </p:style>
+        <p:txBody>
+          <a:bodyPr rtlCol="0" anchor="ctr"/>
+          <a:lstStyle/>
+          <a:p>
+            <a:pPr algn="ctr"/>
+            <a:endParaRPr lang="en-SG"/>
+          </a:p>
+        </p:txBody>
+      </p:sp>
+      <p:cxnSp>
+        <p:nvCxnSpPr>
+          <p:cNvPr id="226" name="Elbow Connector 136">
+            <a:extLst>
+              <a:ext uri="{FF2B5EF4-FFF2-40B4-BE49-F238E27FC236}">
+                <a16:creationId xmlns:a16="http://schemas.microsoft.com/office/drawing/2014/main" id="{128B1936-AD18-4008-8361-88B3CC0FB74D}"/>
+              </a:ext>
+            </a:extLst>
+          </p:cNvPr>
+          <p:cNvCxnSpPr>
+            <a:cxnSpLocks/>
+            <a:stCxn id="222" idx="3"/>
+            <a:endCxn id="211" idx="1"/>
+          </p:cNvCxnSpPr>
+          <p:nvPr/>
+        </p:nvCxnSpPr>
+        <p:spPr>
+          <a:xfrm>
+            <a:off x="3699744" y="5116079"/>
+            <a:ext cx="390485" cy="33946"/>
+          </a:xfrm>
+          <a:prstGeom prst="bentConnector3">
+            <a:avLst>
+              <a:gd name="adj1" fmla="val 50000"/>
+            </a:avLst>
+          </a:prstGeom>
+          <a:ln w="19050">
+            <a:solidFill>
+              <a:schemeClr val="accent3"/>
+            </a:solidFill>
+            <a:headEnd type="none" w="med" len="med"/>
+            <a:tailEnd type="arrow" w="med" len="med"/>
+          </a:ln>
+          <a:effectLst/>
+        </p:spPr>
+        <p:style>
+          <a:lnRef idx="1">
+            <a:schemeClr val="accent2"/>
+          </a:lnRef>
+          <a:fillRef idx="2">
+            <a:schemeClr val="accent2"/>
+          </a:fillRef>
+          <a:effectRef idx="1">
+            <a:schemeClr val="accent2"/>
+          </a:effectRef>
+          <a:fontRef idx="minor">
+            <a:schemeClr val="dk1"/>
+          </a:fontRef>
+        </p:style>
+      </p:cxnSp>
+      <p:sp>
+        <p:nvSpPr>
+          <p:cNvPr id="230" name="Rectangle 229">
+            <a:extLst>
+              <a:ext uri="{FF2B5EF4-FFF2-40B4-BE49-F238E27FC236}">
+                <a16:creationId xmlns:a16="http://schemas.microsoft.com/office/drawing/2014/main" id="{E219E4C8-BF6F-4488-8DBD-C8184FA46030}"/>
+              </a:ext>
+            </a:extLst>
+          </p:cNvPr>
+          <p:cNvSpPr/>
+          <p:nvPr/>
+        </p:nvSpPr>
+        <p:spPr>
+          <a:xfrm>
+            <a:off x="2297684" y="4387489"/>
+            <a:ext cx="229325" cy="160062"/>
+          </a:xfrm>
+          <a:prstGeom prst="rect">
+            <a:avLst/>
+          </a:prstGeom>
+          <a:solidFill>
+            <a:schemeClr val="accent3">
+              <a:lumMod val="20000"/>
+              <a:lumOff val="80000"/>
+              <a:alpha val="80000"/>
+            </a:schemeClr>
+          </a:solidFill>
+          <a:ln>
+            <a:noFill/>
+          </a:ln>
+          <a:effectLst>
+            <a:softEdge rad="31750"/>
+          </a:effectLst>
+        </p:spPr>
+        <p:style>
+          <a:lnRef idx="2">
+            <a:schemeClr val="accent1">
+              <a:shade val="50000"/>
+            </a:schemeClr>
+          </a:lnRef>
+          <a:fillRef idx="1">
+            <a:schemeClr val="accent1"/>
+          </a:fillRef>
+          <a:effectRef idx="0">
+            <a:schemeClr val="accent1"/>
+          </a:effectRef>
+          <a:fontRef idx="minor">
+            <a:schemeClr val="lt1"/>
+          </a:fontRef>
+        </p:style>
+        <p:txBody>
+          <a:bodyPr rtlCol="0" anchor="ctr"/>
+          <a:lstStyle/>
+          <a:p>
+            <a:pPr algn="ctr"/>
+            <a:endParaRPr lang="en-SG"/>
+          </a:p>
+        </p:txBody>
+      </p:sp>
+      <p:sp>
+        <p:nvSpPr>
+          <p:cNvPr id="231" name="Rectangle 230">
+            <a:extLst>
+              <a:ext uri="{FF2B5EF4-FFF2-40B4-BE49-F238E27FC236}">
+                <a16:creationId xmlns:a16="http://schemas.microsoft.com/office/drawing/2014/main" id="{3960B0B3-77AE-424C-877B-73AB7D009310}"/>
+              </a:ext>
+            </a:extLst>
+          </p:cNvPr>
+          <p:cNvSpPr/>
+          <p:nvPr/>
+        </p:nvSpPr>
+        <p:spPr>
+          <a:xfrm>
+            <a:off x="2101341" y="4387489"/>
+            <a:ext cx="229325" cy="160062"/>
+          </a:xfrm>
+          <a:prstGeom prst="rect">
+            <a:avLst/>
+          </a:prstGeom>
+          <a:solidFill>
+            <a:schemeClr val="accent3">
+              <a:lumMod val="20000"/>
+              <a:lumOff val="80000"/>
+              <a:alpha val="80000"/>
+            </a:schemeClr>
+          </a:solidFill>
+          <a:ln>
+            <a:noFill/>
+          </a:ln>
+          <a:effectLst>
+            <a:softEdge rad="31750"/>
+          </a:effectLst>
+        </p:spPr>
+        <p:style>
+          <a:lnRef idx="2">
+            <a:schemeClr val="accent1">
+              <a:shade val="50000"/>
+            </a:schemeClr>
+          </a:lnRef>
+          <a:fillRef idx="1">
+            <a:schemeClr val="accent1"/>
+          </a:fillRef>
+          <a:effectRef idx="0">
+            <a:schemeClr val="accent1"/>
+          </a:effectRef>
+          <a:fontRef idx="minor">
+            <a:schemeClr val="lt1"/>
+          </a:fontRef>
+        </p:style>
+        <p:txBody>
+          <a:bodyPr rtlCol="0" anchor="ctr"/>
+          <a:lstStyle/>
+          <a:p>
+            <a:pPr algn="ctr"/>
+            <a:endParaRPr lang="en-SG"/>
+          </a:p>
+        </p:txBody>
+      </p:sp>
+      <p:cxnSp>
+        <p:nvCxnSpPr>
+          <p:cNvPr id="174" name="Elbow Connector 63">
+            <a:extLst>
+              <a:ext uri="{FF2B5EF4-FFF2-40B4-BE49-F238E27FC236}">
+                <a16:creationId xmlns:a16="http://schemas.microsoft.com/office/drawing/2014/main" id="{D587DD42-38BF-4620-AC8D-85D2D6B9C565}"/>
+              </a:ext>
+            </a:extLst>
+          </p:cNvPr>
+          <p:cNvCxnSpPr>
+            <a:cxnSpLocks/>
+            <a:stCxn id="39" idx="2"/>
+            <a:endCxn id="164" idx="1"/>
+          </p:cNvCxnSpPr>
+          <p:nvPr/>
+        </p:nvCxnSpPr>
+        <p:spPr>
+          <a:xfrm rot="16200000" flipH="1">
+            <a:off x="1572400" y="3711751"/>
+            <a:ext cx="1873899" cy="186446"/>
+          </a:xfrm>
+          <a:prstGeom prst="bentConnector2">
+            <a:avLst/>
+          </a:prstGeom>
+          <a:ln w="19050">
+            <a:solidFill>
+              <a:schemeClr val="accent3"/>
+            </a:solidFill>
+            <a:headEnd type="none" w="med" len="med"/>
+            <a:tailEnd type="arrow" w="med" len="med"/>
+          </a:ln>
+          <a:effectLst/>
+        </p:spPr>
+        <p:style>
+          <a:lnRef idx="1">
+            <a:schemeClr val="accent2"/>
+          </a:lnRef>
+          <a:fillRef idx="2">
+            <a:schemeClr val="accent2"/>
+          </a:fillRef>
+          <a:effectRef idx="1">
+            <a:schemeClr val="accent2"/>
+          </a:effectRef>
+          <a:fontRef idx="minor">
+            <a:schemeClr val="dk1"/>
+          </a:fontRef>
+        </p:style>
+      </p:cxnSp>
+      <p:cxnSp>
+        <p:nvCxnSpPr>
+          <p:cNvPr id="53" name="Elbow Connector 63"/>
+          <p:cNvCxnSpPr>
+            <a:cxnSpLocks/>
+            <a:stCxn id="186" idx="2"/>
+            <a:endCxn id="38" idx="1"/>
+          </p:cNvCxnSpPr>
+          <p:nvPr/>
+        </p:nvCxnSpPr>
+        <p:spPr>
+          <a:xfrm rot="16200000" flipH="1">
+            <a:off x="872537" y="4054659"/>
+            <a:ext cx="3092649" cy="371863"/>
+          </a:xfrm>
+          <a:prstGeom prst="bentConnector2">
+            <a:avLst/>
+          </a:prstGeom>
+          <a:ln w="19050">
+            <a:solidFill>
+              <a:schemeClr val="accent3"/>
+            </a:solidFill>
+            <a:headEnd type="none" w="med" len="med"/>
+            <a:tailEnd type="arrow" w="med" len="med"/>
+          </a:ln>
+          <a:effectLst/>
+        </p:spPr>
+        <p:style>
+          <a:lnRef idx="1">
+            <a:schemeClr val="accent2"/>
+          </a:lnRef>
+          <a:fillRef idx="2">
+            <a:schemeClr val="accent2"/>
+          </a:fillRef>
+          <a:effectRef idx="1">
+            <a:schemeClr val="accent2"/>
+          </a:effectRef>
+          <a:fontRef idx="minor">
+            <a:schemeClr val="dk1"/>
+          </a:fontRef>
+        </p:style>
+      </p:cxnSp>
+      <p:sp>
+        <p:nvSpPr>
+          <p:cNvPr id="232" name="Rectangle 231">
+            <a:extLst>
+              <a:ext uri="{FF2B5EF4-FFF2-40B4-BE49-F238E27FC236}">
+                <a16:creationId xmlns:a16="http://schemas.microsoft.com/office/drawing/2014/main" id="{581A2C0F-7470-4FF0-A709-0F807FA6D1D8}"/>
+              </a:ext>
+            </a:extLst>
+          </p:cNvPr>
+          <p:cNvSpPr/>
+          <p:nvPr/>
+        </p:nvSpPr>
+        <p:spPr>
+          <a:xfrm>
+            <a:off x="3834620" y="4735756"/>
+            <a:ext cx="229325" cy="160062"/>
+          </a:xfrm>
+          <a:prstGeom prst="rect">
+            <a:avLst/>
+          </a:prstGeom>
+          <a:solidFill>
+            <a:schemeClr val="accent3">
+              <a:lumMod val="20000"/>
+              <a:lumOff val="80000"/>
+              <a:alpha val="80000"/>
+            </a:schemeClr>
+          </a:solidFill>
+          <a:ln>
+            <a:noFill/>
+          </a:ln>
+          <a:effectLst>
+            <a:softEdge rad="31750"/>
+          </a:effectLst>
+        </p:spPr>
+        <p:style>
+          <a:lnRef idx="2">
+            <a:schemeClr val="accent1">
+              <a:shade val="50000"/>
+            </a:schemeClr>
+          </a:lnRef>
+          <a:fillRef idx="1">
+            <a:schemeClr val="accent1"/>
+          </a:fillRef>
+          <a:effectRef idx="0">
+            <a:schemeClr val="accent1"/>
+          </a:effectRef>
+          <a:fontRef idx="minor">
+            <a:schemeClr val="lt1"/>
+          </a:fontRef>
+        </p:style>
+        <p:txBody>
+          <a:bodyPr rtlCol="0" anchor="ctr"/>
+          <a:lstStyle/>
+          <a:p>
+            <a:pPr algn="ctr"/>
+            <a:endParaRPr lang="en-SG"/>
+          </a:p>
+        </p:txBody>
+      </p:sp>
+      <p:cxnSp>
+        <p:nvCxnSpPr>
+          <p:cNvPr id="223" name="Elbow Connector 136">
+            <a:extLst>
+              <a:ext uri="{FF2B5EF4-FFF2-40B4-BE49-F238E27FC236}">
+                <a16:creationId xmlns:a16="http://schemas.microsoft.com/office/drawing/2014/main" id="{080B80C9-0AE5-4417-8F58-708D749E522F}"/>
+              </a:ext>
+            </a:extLst>
+          </p:cNvPr>
+          <p:cNvCxnSpPr>
+            <a:cxnSpLocks/>
+            <a:stCxn id="221" idx="3"/>
+            <a:endCxn id="210" idx="1"/>
+          </p:cNvCxnSpPr>
+          <p:nvPr/>
+        </p:nvCxnSpPr>
+        <p:spPr>
+          <a:xfrm>
+            <a:off x="3686160" y="4806313"/>
+            <a:ext cx="404069" cy="4537"/>
+          </a:xfrm>
+          <a:prstGeom prst="bentConnector3">
+            <a:avLst>
+              <a:gd name="adj1" fmla="val 50000"/>
+            </a:avLst>
+          </a:prstGeom>
+          <a:ln w="19050">
+            <a:solidFill>
+              <a:schemeClr val="accent3"/>
+            </a:solidFill>
+            <a:headEnd type="none" w="med" len="med"/>
+            <a:tailEnd type="arrow" w="med" len="med"/>
+          </a:ln>
+          <a:effectLst/>
+        </p:spPr>
+        <p:style>
+          <a:lnRef idx="1">
+            <a:schemeClr val="accent2"/>
+          </a:lnRef>
+          <a:fillRef idx="2">
+            <a:schemeClr val="accent2"/>
+          </a:fillRef>
+          <a:effectRef idx="1">
+            <a:schemeClr val="accent2"/>
+          </a:effectRef>
+          <a:fontRef idx="minor">
+            <a:schemeClr val="dk1"/>
+          </a:fontRef>
+        </p:style>
+      </p:cxnSp>
+      <p:cxnSp>
+        <p:nvCxnSpPr>
+          <p:cNvPr id="233" name="Elbow Connector 63">
+            <a:extLst>
+              <a:ext uri="{FF2B5EF4-FFF2-40B4-BE49-F238E27FC236}">
+                <a16:creationId xmlns:a16="http://schemas.microsoft.com/office/drawing/2014/main" id="{16A306A1-FD64-4CB8-B1D1-B0C7FF14FDE8}"/>
+              </a:ext>
+            </a:extLst>
+          </p:cNvPr>
+          <p:cNvCxnSpPr>
+            <a:cxnSpLocks/>
+            <a:endCxn id="117" idx="0"/>
+          </p:cNvCxnSpPr>
+          <p:nvPr/>
+        </p:nvCxnSpPr>
+        <p:spPr>
+          <a:xfrm flipV="1">
+            <a:off x="5211515" y="4724398"/>
+            <a:ext cx="1524001" cy="142242"/>
+          </a:xfrm>
+          <a:prstGeom prst="bentConnector3">
+            <a:avLst>
+              <a:gd name="adj1" fmla="val 50000"/>
+            </a:avLst>
+          </a:prstGeom>
+          <a:ln w="19050" cap="flat">
+            <a:solidFill>
+              <a:schemeClr val="accent3"/>
+            </a:solidFill>
+            <a:prstDash val="sysDash"/>
+            <a:headEnd type="none" w="med" len="med"/>
+            <a:tailEnd type="arrow" w="med" len="med"/>
+          </a:ln>
+          <a:effectLst/>
+        </p:spPr>
+        <p:style>
+          <a:lnRef idx="1">
+            <a:schemeClr val="accent2"/>
+          </a:lnRef>
+          <a:fillRef idx="2">
+            <a:schemeClr val="accent2"/>
+          </a:fillRef>
+          <a:effectRef idx="1">
+            <a:schemeClr val="accent2"/>
+          </a:effectRef>
+          <a:fontRef idx="minor">
+            <a:schemeClr val="dk1"/>
+          </a:fontRef>
+        </p:style>
+      </p:cxnSp>
+      <p:cxnSp>
+        <p:nvCxnSpPr>
+          <p:cNvPr id="236" name="Elbow Connector 63">
+            <a:extLst>
+              <a:ext uri="{FF2B5EF4-FFF2-40B4-BE49-F238E27FC236}">
+                <a16:creationId xmlns:a16="http://schemas.microsoft.com/office/drawing/2014/main" id="{94C4520A-37AB-4399-B93B-C642FEFE756D}"/>
+              </a:ext>
+            </a:extLst>
+          </p:cNvPr>
+          <p:cNvCxnSpPr>
+            <a:cxnSpLocks/>
+            <a:endCxn id="117" idx="0"/>
+          </p:cNvCxnSpPr>
+          <p:nvPr/>
+        </p:nvCxnSpPr>
+        <p:spPr>
+          <a:xfrm flipV="1">
+            <a:off x="5210148" y="4724398"/>
+            <a:ext cx="1525368" cy="503961"/>
+          </a:xfrm>
+          <a:prstGeom prst="bentConnector3">
+            <a:avLst>
+              <a:gd name="adj1" fmla="val 50000"/>
+            </a:avLst>
+          </a:prstGeom>
+          <a:ln w="19050" cap="flat">
+            <a:solidFill>
+              <a:schemeClr val="accent3"/>
+            </a:solidFill>
+            <a:prstDash val="sysDash"/>
+            <a:headEnd type="none" w="med" len="med"/>
+            <a:tailEnd type="arrow" w="med" len="med"/>
+          </a:ln>
+          <a:effectLst/>
+        </p:spPr>
+        <p:style>
+          <a:lnRef idx="1">
+            <a:schemeClr val="accent2"/>
+          </a:lnRef>
+          <a:fillRef idx="2">
+            <a:schemeClr val="accent2"/>
+          </a:fillRef>
+          <a:effectRef idx="1">
+            <a:schemeClr val="accent2"/>
+          </a:effectRef>
+          <a:fontRef idx="minor">
+            <a:schemeClr val="dk1"/>
+          </a:fontRef>
+        </p:style>
+      </p:cxnSp>
     </p:spTree>
     <p:extLst>
       <p:ext uri="{BB962C8B-B14F-4D97-AF65-F5344CB8AC3E}">

</xml_diff>